<commit_message>
Add presentation. Update report
</commit_message>
<xml_diff>
--- a/docs/presentation.pptx
+++ b/docs/presentation.pptx
@@ -5,13 +5,18 @@
     <p:sldMasterId id="2147483737" r:id="rId1"/>
   </p:sldMasterIdLst>
   <p:notesMasterIdLst>
-    <p:notesMasterId r:id="rId6"/>
+    <p:notesMasterId r:id="rId11"/>
   </p:notesMasterIdLst>
   <p:sldIdLst>
     <p:sldId id="257" r:id="rId2"/>
     <p:sldId id="274" r:id="rId3"/>
     <p:sldId id="275" r:id="rId4"/>
-    <p:sldId id="276" r:id="rId5"/>
+    <p:sldId id="280" r:id="rId5"/>
+    <p:sldId id="281" r:id="rId6"/>
+    <p:sldId id="283" r:id="rId7"/>
+    <p:sldId id="346" r:id="rId8"/>
+    <p:sldId id="278" r:id="rId9"/>
+    <p:sldId id="345" r:id="rId10"/>
   </p:sldIdLst>
   <p:sldSz cx="12192000" cy="6858000"/>
   <p:notesSz cx="6858000" cy="9144000"/>
@@ -211,7 +216,7 @@
           <a:p>
             <a:fld id="{7068CBD5-E1ED-416D-8548-E29F527133A0}" type="datetimeFigureOut">
               <a:rPr lang="pt-PT" smtClean="0"/>
-              <a:t>27/03/2021</a:t>
+              <a:t>02/06/2021</a:t>
             </a:fld>
             <a:endParaRPr lang="pt-PT" dirty="0"/>
           </a:p>
@@ -647,7 +652,7 @@
           <a:p>
             <a:fld id="{DE2DA490-63B1-4B7A-B9AD-9A630F5DB54A}" type="datetimeFigureOut">
               <a:rPr lang="pt-PT" smtClean="0"/>
-              <a:t>27/03/2021</a:t>
+              <a:t>02/06/2021</a:t>
             </a:fld>
             <a:endParaRPr lang="pt-PT" dirty="0"/>
           </a:p>
@@ -875,7 +880,7 @@
           <a:p>
             <a:fld id="{DE2DA490-63B1-4B7A-B9AD-9A630F5DB54A}" type="datetimeFigureOut">
               <a:rPr lang="pt-PT" smtClean="0"/>
-              <a:t>27/03/2021</a:t>
+              <a:t>02/06/2021</a:t>
             </a:fld>
             <a:endParaRPr lang="pt-PT" dirty="0"/>
           </a:p>
@@ -1055,7 +1060,7 @@
           <a:p>
             <a:fld id="{DE2DA490-63B1-4B7A-B9AD-9A630F5DB54A}" type="datetimeFigureOut">
               <a:rPr lang="pt-PT" smtClean="0"/>
-              <a:t>27/03/2021</a:t>
+              <a:t>02/06/2021</a:t>
             </a:fld>
             <a:endParaRPr lang="pt-PT" dirty="0"/>
           </a:p>
@@ -1225,7 +1230,7 @@
           <a:p>
             <a:fld id="{DE2DA490-63B1-4B7A-B9AD-9A630F5DB54A}" type="datetimeFigureOut">
               <a:rPr lang="pt-PT" smtClean="0"/>
-              <a:t>27/03/2021</a:t>
+              <a:t>02/06/2021</a:t>
             </a:fld>
             <a:endParaRPr lang="pt-PT" dirty="0"/>
           </a:p>
@@ -1479,7 +1484,7 @@
           <a:p>
             <a:fld id="{DE2DA490-63B1-4B7A-B9AD-9A630F5DB54A}" type="datetimeFigureOut">
               <a:rPr lang="pt-PT" smtClean="0"/>
-              <a:t>27/03/2021</a:t>
+              <a:t>02/06/2021</a:t>
             </a:fld>
             <a:endParaRPr lang="pt-PT" dirty="0"/>
           </a:p>
@@ -1805,7 +1810,7 @@
           <a:p>
             <a:fld id="{DE2DA490-63B1-4B7A-B9AD-9A630F5DB54A}" type="datetimeFigureOut">
               <a:rPr lang="pt-PT" smtClean="0"/>
-              <a:t>27/03/2021</a:t>
+              <a:t>02/06/2021</a:t>
             </a:fld>
             <a:endParaRPr lang="pt-PT" dirty="0"/>
           </a:p>
@@ -2256,7 +2261,7 @@
           <a:p>
             <a:fld id="{DE2DA490-63B1-4B7A-B9AD-9A630F5DB54A}" type="datetimeFigureOut">
               <a:rPr lang="pt-PT" smtClean="0"/>
-              <a:t>27/03/2021</a:t>
+              <a:t>02/06/2021</a:t>
             </a:fld>
             <a:endParaRPr lang="pt-PT" dirty="0"/>
           </a:p>
@@ -2374,7 +2379,7 @@
           <a:p>
             <a:fld id="{DE2DA490-63B1-4B7A-B9AD-9A630F5DB54A}" type="datetimeFigureOut">
               <a:rPr lang="pt-PT" smtClean="0"/>
-              <a:t>27/03/2021</a:t>
+              <a:t>02/06/2021</a:t>
             </a:fld>
             <a:endParaRPr lang="pt-PT" dirty="0"/>
           </a:p>
@@ -2469,7 +2474,7 @@
           <a:p>
             <a:fld id="{DE2DA490-63B1-4B7A-B9AD-9A630F5DB54A}" type="datetimeFigureOut">
               <a:rPr lang="pt-PT" smtClean="0"/>
-              <a:t>27/03/2021</a:t>
+              <a:t>02/06/2021</a:t>
             </a:fld>
             <a:endParaRPr lang="pt-PT" dirty="0"/>
           </a:p>
@@ -2756,7 +2761,7 @@
           <a:p>
             <a:fld id="{DE2DA490-63B1-4B7A-B9AD-9A630F5DB54A}" type="datetimeFigureOut">
               <a:rPr lang="pt-PT" smtClean="0"/>
-              <a:t>27/03/2021</a:t>
+              <a:t>02/06/2021</a:t>
             </a:fld>
             <a:endParaRPr lang="pt-PT" dirty="0"/>
           </a:p>
@@ -3077,7 +3082,7 @@
           <a:p>
             <a:fld id="{DE2DA490-63B1-4B7A-B9AD-9A630F5DB54A}" type="datetimeFigureOut">
               <a:rPr lang="pt-PT" smtClean="0"/>
-              <a:t>27/03/2021</a:t>
+              <a:t>02/06/2021</a:t>
             </a:fld>
             <a:endParaRPr lang="pt-PT" dirty="0"/>
           </a:p>
@@ -3331,7 +3336,7 @@
           <a:p>
             <a:fld id="{DE2DA490-63B1-4B7A-B9AD-9A630F5DB54A}" type="datetimeFigureOut">
               <a:rPr lang="pt-PT" smtClean="0"/>
-              <a:t>27/03/2021</a:t>
+              <a:t>02/06/2021</a:t>
             </a:fld>
             <a:endParaRPr lang="pt-PT" dirty="0"/>
           </a:p>
@@ -4136,7 +4141,7 @@
             </a:lvl9pPr>
           </a:lstStyle>
           <a:p>
-            <a:pPr marL="0" algn="just">
+            <a:pPr marL="0">
               <a:buNone/>
             </a:pPr>
             <a:r>
@@ -4151,7 +4156,7 @@
             </a:r>
           </a:p>
           <a:p>
-            <a:pPr marL="0" algn="just">
+            <a:pPr marL="0">
               <a:buNone/>
             </a:pPr>
             <a:r>
@@ -4166,7 +4171,7 @@
             </a:r>
           </a:p>
           <a:p>
-            <a:pPr marL="0" algn="just">
+            <a:pPr marL="0">
               <a:buNone/>
             </a:pPr>
             <a:endParaRPr lang="en-US" sz="2000" b="1" dirty="0">
@@ -4178,7 +4183,7 @@
             </a:endParaRPr>
           </a:p>
           <a:p>
-            <a:pPr marL="0" algn="just">
+            <a:pPr marL="0">
               <a:buNone/>
             </a:pPr>
             <a:r>
@@ -4193,7 +4198,7 @@
             </a:r>
           </a:p>
           <a:p>
-            <a:pPr marL="0" algn="just">
+            <a:pPr marL="0">
               <a:buNone/>
             </a:pPr>
             <a:r>
@@ -4267,7 +4272,6 @@
           </a:bodyPr>
           <a:lstStyle/>
           <a:p>
-            <a:pPr algn="just"/>
             <a:r>
               <a:rPr lang="en-US" sz="4800" dirty="0">
                 <a:solidFill>
@@ -4559,7 +4563,7 @@
             </a:lvl9pPr>
           </a:lstStyle>
           <a:p>
-            <a:pPr marL="0" indent="0" algn="just">
+            <a:pPr marL="0" indent="0">
               <a:buNone/>
             </a:pPr>
             <a:r>
@@ -4598,7 +4602,7 @@
             </a:endParaRPr>
           </a:p>
           <a:p>
-            <a:pPr marL="0" indent="0" algn="just">
+            <a:pPr marL="0" indent="0">
               <a:buNone/>
             </a:pPr>
             <a:r>
@@ -4647,7 +4651,7 @@
             </a:endParaRPr>
           </a:p>
           <a:p>
-            <a:pPr marL="0" indent="0" algn="just">
+            <a:pPr marL="0" indent="0">
               <a:buNone/>
             </a:pPr>
             <a:r>
@@ -4696,7 +4700,7 @@
             </a:endParaRPr>
           </a:p>
           <a:p>
-            <a:pPr marL="0" indent="0" algn="just">
+            <a:pPr marL="0" indent="0">
               <a:buNone/>
             </a:pPr>
             <a:r>
@@ -4832,7 +4836,7 @@
         </p:nvSpPr>
         <p:spPr>
           <a:xfrm>
-            <a:off x="770040" y="2792690"/>
+            <a:off x="795207" y="2792690"/>
             <a:ext cx="10541728" cy="1272620"/>
           </a:xfrm>
         </p:spPr>
@@ -4842,7 +4846,6 @@
           </a:bodyPr>
           <a:lstStyle/>
           <a:p>
-            <a:pPr algn="just"/>
             <a:r>
               <a:rPr lang="en-US" sz="4800" dirty="0">
                 <a:solidFill>
@@ -4851,7 +4854,7 @@
                 <a:latin typeface="Nunito Sans" panose="00000800000000000000" pitchFamily="2" charset="0"/>
                 <a:cs typeface="Arial" panose="020B0604020202020204" pitchFamily="34" charset="0"/>
               </a:rPr>
-              <a:t>Lorem ipsum</a:t>
+              <a:t>Contexto</a:t>
             </a:r>
             <a:endParaRPr lang="pt-PT" sz="4800" dirty="0">
               <a:solidFill>
@@ -4859,53 +4862,6 @@
               </a:solidFill>
               <a:latin typeface="Nunito Sans" panose="00000800000000000000" pitchFamily="2" charset="0"/>
               <a:cs typeface="Arial" panose="020B0604020202020204" pitchFamily="34" charset="0"/>
-            </a:endParaRPr>
-          </a:p>
-        </p:txBody>
-      </p:sp>
-      <p:sp>
-        <p:nvSpPr>
-          <p:cNvPr id="8" name="TextBox 7">
-            <a:extLst>
-              <a:ext uri="{FF2B5EF4-FFF2-40B4-BE49-F238E27FC236}">
-                <a16:creationId xmlns:a16="http://schemas.microsoft.com/office/drawing/2014/main" id="{94CDDACB-2EAA-427F-A9A9-31A361AD4D79}"/>
-              </a:ext>
-            </a:extLst>
-          </p:cNvPr>
-          <p:cNvSpPr txBox="1"/>
-          <p:nvPr/>
-        </p:nvSpPr>
-        <p:spPr>
-          <a:xfrm>
-            <a:off x="11291888" y="246742"/>
-            <a:ext cx="916781" cy="369332"/>
-          </a:xfrm>
-          <a:prstGeom prst="rect">
-            <a:avLst/>
-          </a:prstGeom>
-          <a:noFill/>
-        </p:spPr>
-        <p:txBody>
-          <a:bodyPr wrap="square" rtlCol="0">
-            <a:spAutoFit/>
-          </a:bodyPr>
-          <a:lstStyle/>
-          <a:p>
-            <a:pPr algn="ctr"/>
-            <a:r>
-              <a:rPr lang="en-US" dirty="0">
-                <a:solidFill>
-                  <a:schemeClr val="bg1"/>
-                </a:solidFill>
-                <a:latin typeface="Nunito Sans" panose="00000800000000000000" pitchFamily="2" charset="0"/>
-              </a:rPr>
-              <a:t>1</a:t>
-            </a:r>
-            <a:endParaRPr lang="pt-PT" dirty="0">
-              <a:solidFill>
-                <a:schemeClr val="bg1"/>
-              </a:solidFill>
-              <a:latin typeface="Nunito Sans" panose="00000800000000000000" pitchFamily="2" charset="0"/>
             </a:endParaRPr>
           </a:p>
         </p:txBody>
@@ -4994,7 +4950,7 @@
         </p:nvSpPr>
         <p:spPr>
           <a:xfrm>
-            <a:off x="812254" y="822231"/>
+            <a:off x="803865" y="822231"/>
             <a:ext cx="9840686" cy="5949950"/>
           </a:xfrm>
           <a:prstGeom prst="rect">
@@ -5260,68 +5216,93 @@
                 <a:latin typeface="Nunito Sans" panose="00000800000000000000" pitchFamily="2" charset="0"/>
                 <a:cs typeface="Arial" panose="020B0604020202020204" pitchFamily="34" charset="0"/>
               </a:rPr>
-              <a:t>Lorem Ipsum</a:t>
-            </a:r>
-          </a:p>
-          <a:p>
-            <a:pPr algn="just">
+              <a:t>Propósito</a:t>
+            </a:r>
+            <a:endParaRPr lang="pt-PT" dirty="0">
+              <a:effectLst/>
+              <a:latin typeface="Nunito Sans" panose="00000500000000000000" pitchFamily="2" charset="0"/>
+            </a:endParaRPr>
+          </a:p>
+          <a:p>
+            <a:pPr marL="0" indent="0">
               <a:lnSpc>
                 <a:spcPct val="160000"/>
               </a:lnSpc>
+              <a:buNone/>
+            </a:pPr>
+            <a:r>
+              <a:rPr lang="pt-PT" dirty="0">
+                <a:latin typeface="Nunito Sans" panose="00000500000000000000" pitchFamily="2" charset="0"/>
+              </a:rPr>
+              <a:t>O propósito da aplicação incide sobre a comunidade escutista portuguesa. Assim, pretende:</a:t>
+            </a:r>
+            <a:endParaRPr lang="pt-PT" dirty="0">
+              <a:effectLst/>
+              <a:latin typeface="Nunito Sans" panose="00000500000000000000" pitchFamily="2" charset="0"/>
+            </a:endParaRPr>
+          </a:p>
+          <a:p>
+            <a:pPr marL="342900" indent="-342900">
+              <a:lnSpc>
+                <a:spcPct val="160000"/>
+              </a:lnSpc>
+              <a:buFont typeface="+mj-lt"/>
+              <a:buAutoNum type="arabicPeriod"/>
             </a:pPr>
             <a:r>
               <a:rPr lang="pt-PT" dirty="0">
                 <a:effectLst/>
                 <a:latin typeface="Nunito Sans" panose="00000500000000000000" pitchFamily="2" charset="0"/>
               </a:rPr>
-              <a:t>Lorem ipsum dolor sit amet, consectetur adipiscing elit, sed do eiusmod tempor incididunt ut labore et dolore magna aliqua. Ut enim ad minim veniam, quis nostrud exercitation ullamco laboris nisi ut aliquip ex ea commodo consequat. Duis aute irure dolor in reprehenderit in voluptate velit esse cillum dolore eu fugiat nulla pariatur.</a:t>
-            </a:r>
-          </a:p>
-        </p:txBody>
-      </p:sp>
-      <p:sp>
-        <p:nvSpPr>
-          <p:cNvPr id="5" name="TextBox 7">
-            <a:extLst>
-              <a:ext uri="{FF2B5EF4-FFF2-40B4-BE49-F238E27FC236}">
-                <a16:creationId xmlns:a16="http://schemas.microsoft.com/office/drawing/2014/main" id="{7437BA33-B6C3-4DE1-B260-0036B0652EF2}"/>
-              </a:ext>
-            </a:extLst>
-          </p:cNvPr>
-          <p:cNvSpPr txBox="1"/>
-          <p:nvPr/>
-        </p:nvSpPr>
-        <p:spPr>
-          <a:xfrm>
-            <a:off x="11291888" y="246742"/>
-            <a:ext cx="916781" cy="369332"/>
-          </a:xfrm>
-          <a:prstGeom prst="rect">
-            <a:avLst/>
-          </a:prstGeom>
-          <a:noFill/>
-        </p:spPr>
-        <p:txBody>
-          <a:bodyPr wrap="square" rtlCol="0">
-            <a:spAutoFit/>
-          </a:bodyPr>
-          <a:lstStyle/>
-          <a:p>
-            <a:pPr algn="ctr"/>
-            <a:r>
-              <a:rPr lang="en-US" dirty="0">
-                <a:solidFill>
-                  <a:schemeClr val="bg1"/>
-                </a:solidFill>
-                <a:latin typeface="Nunito Sans" panose="00000800000000000000" pitchFamily="2" charset="0"/>
+              <a:t>Servir de suporte ao quotidiano dos indivíduos pertencentes à comunidade;</a:t>
+            </a:r>
+          </a:p>
+          <a:p>
+            <a:pPr marL="342900" indent="-342900">
+              <a:lnSpc>
+                <a:spcPct val="160000"/>
+              </a:lnSpc>
+              <a:buFont typeface="+mj-lt"/>
+              <a:buAutoNum type="arabicPeriod"/>
+            </a:pPr>
+            <a:r>
+              <a:rPr lang="pt-PT" dirty="0">
+                <a:effectLst/>
+                <a:latin typeface="Nunito Sans" panose="00000500000000000000" pitchFamily="2" charset="0"/>
               </a:rPr>
-              <a:t>2</a:t>
+              <a:t>Aproximar </a:t>
+            </a:r>
+            <a:r>
+              <a:rPr lang="pt-PT" dirty="0">
+                <a:latin typeface="Nunito Sans" panose="00000500000000000000" pitchFamily="2" charset="0"/>
+              </a:rPr>
+              <a:t>e promover convivência entre os elementos da </a:t>
+            </a:r>
+            <a:r>
+              <a:rPr lang="pt-PT" dirty="0">
+                <a:effectLst/>
+                <a:latin typeface="Nunito Sans" panose="00000500000000000000" pitchFamily="2" charset="0"/>
+              </a:rPr>
+              <a:t>comunidade;</a:t>
+            </a:r>
+          </a:p>
+          <a:p>
+            <a:pPr marL="342900" indent="-342900">
+              <a:lnSpc>
+                <a:spcPct val="160000"/>
+              </a:lnSpc>
+              <a:buFont typeface="+mj-lt"/>
+              <a:buAutoNum type="arabicPeriod"/>
+            </a:pPr>
+            <a:r>
+              <a:rPr lang="pt-PT" dirty="0">
+                <a:latin typeface="Nunito Sans" panose="00000500000000000000" pitchFamily="2" charset="0"/>
+              </a:rPr>
+              <a:t>Dar a conhecer a comunidade a potenciais simpatizantes e visitantes.</a:t>
             </a:r>
             <a:endParaRPr lang="pt-PT" dirty="0">
-              <a:solidFill>
-                <a:schemeClr val="bg1"/>
-              </a:solidFill>
-              <a:latin typeface="Nunito Sans" panose="00000800000000000000" pitchFamily="2" charset="0"/>
+              <a:effectLst/>
+              <a:latin typeface="Nunito Sans" panose="00000500000000000000" pitchFamily="2" charset="0"/>
             </a:endParaRPr>
           </a:p>
         </p:txBody>
@@ -5367,7 +5348,1495 @@
     </p:spTree>
     <p:extLst>
       <p:ext uri="{BB962C8B-B14F-4D97-AF65-F5344CB8AC3E}">
-        <p14:creationId xmlns:p14="http://schemas.microsoft.com/office/powerpoint/2010/main" val="2697892717"/>
+        <p14:creationId xmlns:p14="http://schemas.microsoft.com/office/powerpoint/2010/main" val="3776610042"/>
+      </p:ext>
+    </p:extLst>
+  </p:cSld>
+  <p:clrMapOvr>
+    <a:masterClrMapping/>
+  </p:clrMapOvr>
+</p:sld>
+</file>
+
+<file path=ppt/slides/slide5.xml><?xml version="1.0" encoding="utf-8"?>
+<p:sld xmlns:a="http://schemas.openxmlformats.org/drawingml/2006/main" xmlns:r="http://schemas.openxmlformats.org/officeDocument/2006/relationships" xmlns:p="http://schemas.openxmlformats.org/presentationml/2006/main">
+  <p:cSld>
+    <p:spTree>
+      <p:nvGrpSpPr>
+        <p:cNvPr id="1" name=""/>
+        <p:cNvGrpSpPr/>
+        <p:nvPr/>
+      </p:nvGrpSpPr>
+      <p:grpSpPr>
+        <a:xfrm>
+          <a:off x="0" y="0"/>
+          <a:ext cx="0" cy="0"/>
+          <a:chOff x="0" y="0"/>
+          <a:chExt cx="0" cy="0"/>
+        </a:xfrm>
+      </p:grpSpPr>
+      <p:sp>
+        <p:nvSpPr>
+          <p:cNvPr id="2" name="Subtítulo 2">
+            <a:extLst>
+              <a:ext uri="{FF2B5EF4-FFF2-40B4-BE49-F238E27FC236}">
+                <a16:creationId xmlns:a16="http://schemas.microsoft.com/office/drawing/2014/main" id="{4C27BC55-4A1B-4219-AA2F-36521603FBD9}"/>
+              </a:ext>
+            </a:extLst>
+          </p:cNvPr>
+          <p:cNvSpPr txBox="1">
+            <a:spLocks/>
+          </p:cNvSpPr>
+          <p:nvPr/>
+        </p:nvSpPr>
+        <p:spPr>
+          <a:xfrm>
+            <a:off x="803865" y="822231"/>
+            <a:ext cx="9840686" cy="5949950"/>
+          </a:xfrm>
+          <a:prstGeom prst="rect">
+            <a:avLst/>
+          </a:prstGeom>
+        </p:spPr>
+        <p:txBody>
+          <a:bodyPr vert="horz" lIns="91440" tIns="45720" rIns="91440" bIns="45720" rtlCol="0">
+            <a:normAutofit/>
+          </a:bodyPr>
+          <a:lstStyle>
+            <a:lvl1pPr marL="182880" indent="-182880" algn="l" defTabSz="914400" rtl="0" eaLnBrk="1" latinLnBrk="0" hangingPunct="1">
+              <a:lnSpc>
+                <a:spcPct val="95000"/>
+              </a:lnSpc>
+              <a:spcBef>
+                <a:spcPts val="1400"/>
+              </a:spcBef>
+              <a:spcAft>
+                <a:spcPts val="200"/>
+              </a:spcAft>
+              <a:buClr>
+                <a:schemeClr val="accent1"/>
+              </a:buClr>
+              <a:buSzPct val="80000"/>
+              <a:buFont typeface="Arial" pitchFamily="34" charset="0"/>
+              <a:buChar char="•"/>
+              <a:defRPr sz="1800" kern="1200" spc="10" baseline="0">
+                <a:solidFill>
+                  <a:schemeClr val="tx1"/>
+                </a:solidFill>
+                <a:latin typeface="+mn-lt"/>
+                <a:ea typeface="+mn-ea"/>
+                <a:cs typeface="+mn-cs"/>
+              </a:defRPr>
+            </a:lvl1pPr>
+            <a:lvl2pPr marL="457200" indent="-182880" algn="l" defTabSz="914400" rtl="0" eaLnBrk="1" latinLnBrk="0" hangingPunct="1">
+              <a:lnSpc>
+                <a:spcPct val="90000"/>
+              </a:lnSpc>
+              <a:spcBef>
+                <a:spcPts val="300"/>
+              </a:spcBef>
+              <a:spcAft>
+                <a:spcPts val="300"/>
+              </a:spcAft>
+              <a:buClr>
+                <a:schemeClr val="accent1"/>
+              </a:buClr>
+              <a:buFont typeface="Wingdings 2" pitchFamily="18" charset="2"/>
+              <a:buChar char=""/>
+              <a:defRPr sz="1600" kern="1200">
+                <a:solidFill>
+                  <a:schemeClr val="tx1">
+                    <a:lumMod val="85000"/>
+                    <a:lumOff val="15000"/>
+                  </a:schemeClr>
+                </a:solidFill>
+                <a:latin typeface="+mn-lt"/>
+                <a:ea typeface="+mn-ea"/>
+                <a:cs typeface="+mn-cs"/>
+              </a:defRPr>
+            </a:lvl2pPr>
+            <a:lvl3pPr marL="731520" indent="-182880" algn="l" defTabSz="914400" rtl="0" eaLnBrk="1" latinLnBrk="0" hangingPunct="1">
+              <a:lnSpc>
+                <a:spcPct val="90000"/>
+              </a:lnSpc>
+              <a:spcBef>
+                <a:spcPts val="300"/>
+              </a:spcBef>
+              <a:spcAft>
+                <a:spcPts val="300"/>
+              </a:spcAft>
+              <a:buClr>
+                <a:schemeClr val="accent1"/>
+              </a:buClr>
+              <a:buFont typeface="Wingdings 2" pitchFamily="18" charset="2"/>
+              <a:buChar char=""/>
+              <a:defRPr sz="1400" kern="1200">
+                <a:solidFill>
+                  <a:schemeClr val="tx1">
+                    <a:lumMod val="85000"/>
+                    <a:lumOff val="15000"/>
+                  </a:schemeClr>
+                </a:solidFill>
+                <a:latin typeface="+mn-lt"/>
+                <a:ea typeface="+mn-ea"/>
+                <a:cs typeface="+mn-cs"/>
+              </a:defRPr>
+            </a:lvl3pPr>
+            <a:lvl4pPr marL="1005840" indent="-182880" algn="l" defTabSz="914400" rtl="0" eaLnBrk="1" latinLnBrk="0" hangingPunct="1">
+              <a:lnSpc>
+                <a:spcPct val="90000"/>
+              </a:lnSpc>
+              <a:spcBef>
+                <a:spcPts val="300"/>
+              </a:spcBef>
+              <a:spcAft>
+                <a:spcPts val="300"/>
+              </a:spcAft>
+              <a:buClr>
+                <a:schemeClr val="accent1"/>
+              </a:buClr>
+              <a:buFont typeface="Wingdings 2" pitchFamily="18" charset="2"/>
+              <a:buChar char=""/>
+              <a:defRPr sz="1400" kern="1200">
+                <a:solidFill>
+                  <a:schemeClr val="tx1">
+                    <a:lumMod val="85000"/>
+                    <a:lumOff val="15000"/>
+                  </a:schemeClr>
+                </a:solidFill>
+                <a:latin typeface="+mn-lt"/>
+                <a:ea typeface="+mn-ea"/>
+                <a:cs typeface="+mn-cs"/>
+              </a:defRPr>
+            </a:lvl4pPr>
+            <a:lvl5pPr marL="1280160" indent="-182880" algn="l" defTabSz="914400" rtl="0" eaLnBrk="1" latinLnBrk="0" hangingPunct="1">
+              <a:lnSpc>
+                <a:spcPct val="90000"/>
+              </a:lnSpc>
+              <a:spcBef>
+                <a:spcPts val="300"/>
+              </a:spcBef>
+              <a:spcAft>
+                <a:spcPts val="300"/>
+              </a:spcAft>
+              <a:buClr>
+                <a:schemeClr val="accent1"/>
+              </a:buClr>
+              <a:buFont typeface="Wingdings 2" pitchFamily="18" charset="2"/>
+              <a:buChar char=""/>
+              <a:defRPr sz="1400" kern="1200">
+                <a:solidFill>
+                  <a:schemeClr val="tx1">
+                    <a:lumMod val="85000"/>
+                    <a:lumOff val="15000"/>
+                  </a:schemeClr>
+                </a:solidFill>
+                <a:latin typeface="+mn-lt"/>
+                <a:ea typeface="+mn-ea"/>
+                <a:cs typeface="+mn-cs"/>
+              </a:defRPr>
+            </a:lvl5pPr>
+            <a:lvl6pPr marL="1600000" indent="-228600" algn="l" defTabSz="914400" rtl="0" eaLnBrk="1" latinLnBrk="0" hangingPunct="1">
+              <a:lnSpc>
+                <a:spcPct val="90000"/>
+              </a:lnSpc>
+              <a:spcBef>
+                <a:spcPts val="300"/>
+              </a:spcBef>
+              <a:spcAft>
+                <a:spcPts val="300"/>
+              </a:spcAft>
+              <a:buClr>
+                <a:schemeClr val="accent1"/>
+              </a:buClr>
+              <a:buFont typeface="Wingdings 2" pitchFamily="18" charset="2"/>
+              <a:buChar char=""/>
+              <a:defRPr sz="1400" kern="1200">
+                <a:solidFill>
+                  <a:schemeClr val="tx1">
+                    <a:lumMod val="85000"/>
+                    <a:lumOff val="15000"/>
+                  </a:schemeClr>
+                </a:solidFill>
+                <a:latin typeface="+mn-lt"/>
+                <a:ea typeface="+mn-ea"/>
+                <a:cs typeface="+mn-cs"/>
+              </a:defRPr>
+            </a:lvl6pPr>
+            <a:lvl7pPr marL="1900000" indent="-228600" algn="l" defTabSz="914400" rtl="0" eaLnBrk="1" latinLnBrk="0" hangingPunct="1">
+              <a:lnSpc>
+                <a:spcPct val="90000"/>
+              </a:lnSpc>
+              <a:spcBef>
+                <a:spcPts val="300"/>
+              </a:spcBef>
+              <a:spcAft>
+                <a:spcPts val="300"/>
+              </a:spcAft>
+              <a:buClr>
+                <a:schemeClr val="accent1"/>
+              </a:buClr>
+              <a:buFont typeface="Wingdings 2" pitchFamily="18" charset="2"/>
+              <a:buChar char=""/>
+              <a:defRPr sz="1400" kern="1200">
+                <a:solidFill>
+                  <a:schemeClr val="tx1">
+                    <a:lumMod val="85000"/>
+                    <a:lumOff val="15000"/>
+                  </a:schemeClr>
+                </a:solidFill>
+                <a:latin typeface="+mn-lt"/>
+                <a:ea typeface="+mn-ea"/>
+                <a:cs typeface="+mn-cs"/>
+              </a:defRPr>
+            </a:lvl7pPr>
+            <a:lvl8pPr marL="2200000" indent="-228600" algn="l" defTabSz="914400" rtl="0" eaLnBrk="1" latinLnBrk="0" hangingPunct="1">
+              <a:lnSpc>
+                <a:spcPct val="90000"/>
+              </a:lnSpc>
+              <a:spcBef>
+                <a:spcPts val="300"/>
+              </a:spcBef>
+              <a:spcAft>
+                <a:spcPts val="300"/>
+              </a:spcAft>
+              <a:buClr>
+                <a:schemeClr val="accent1"/>
+              </a:buClr>
+              <a:buFont typeface="Wingdings 2" pitchFamily="18" charset="2"/>
+              <a:buChar char=""/>
+              <a:defRPr sz="1400" kern="1200">
+                <a:solidFill>
+                  <a:schemeClr val="tx1">
+                    <a:lumMod val="85000"/>
+                    <a:lumOff val="15000"/>
+                  </a:schemeClr>
+                </a:solidFill>
+                <a:latin typeface="+mn-lt"/>
+                <a:ea typeface="+mn-ea"/>
+                <a:cs typeface="+mn-cs"/>
+              </a:defRPr>
+            </a:lvl8pPr>
+            <a:lvl9pPr marL="2500000" indent="-228600" algn="l" defTabSz="914400" rtl="0" eaLnBrk="1" latinLnBrk="0" hangingPunct="1">
+              <a:lnSpc>
+                <a:spcPct val="90000"/>
+              </a:lnSpc>
+              <a:spcBef>
+                <a:spcPts val="300"/>
+              </a:spcBef>
+              <a:spcAft>
+                <a:spcPts val="300"/>
+              </a:spcAft>
+              <a:buClr>
+                <a:schemeClr val="accent1"/>
+              </a:buClr>
+              <a:buFont typeface="Wingdings 2" pitchFamily="18" charset="2"/>
+              <a:buChar char=""/>
+              <a:defRPr sz="1400" kern="1200">
+                <a:solidFill>
+                  <a:schemeClr val="tx1">
+                    <a:lumMod val="85000"/>
+                    <a:lumOff val="15000"/>
+                  </a:schemeClr>
+                </a:solidFill>
+                <a:latin typeface="+mn-lt"/>
+                <a:ea typeface="+mn-ea"/>
+                <a:cs typeface="+mn-cs"/>
+              </a:defRPr>
+            </a:lvl9pPr>
+          </a:lstStyle>
+          <a:p>
+            <a:pPr marL="0" indent="0">
+              <a:buNone/>
+            </a:pPr>
+            <a:r>
+              <a:rPr lang="pt-PT" sz="2600" b="1" dirty="0">
+                <a:solidFill>
+                  <a:srgbClr val="1275B2"/>
+                </a:solidFill>
+                <a:latin typeface="Nunito Sans" panose="00000800000000000000" pitchFamily="2" charset="0"/>
+                <a:cs typeface="Arial" panose="020B0604020202020204" pitchFamily="34" charset="0"/>
+              </a:rPr>
+              <a:t>Público-alvo</a:t>
+            </a:r>
+          </a:p>
+          <a:p>
+            <a:pPr>
+              <a:lnSpc>
+                <a:spcPct val="160000"/>
+              </a:lnSpc>
+            </a:pPr>
+            <a:r>
+              <a:rPr lang="pt-PT" dirty="0">
+                <a:effectLst/>
+                <a:latin typeface="Nunito Sans" panose="00000500000000000000" pitchFamily="2" charset="0"/>
+              </a:rPr>
+              <a:t>Comunidade escutista portuguesa;</a:t>
+            </a:r>
+          </a:p>
+          <a:p>
+            <a:pPr>
+              <a:lnSpc>
+                <a:spcPct val="160000"/>
+              </a:lnSpc>
+            </a:pPr>
+            <a:r>
+              <a:rPr lang="pt-PT" dirty="0">
+                <a:latin typeface="Nunito Sans" panose="00000500000000000000" pitchFamily="2" charset="0"/>
+              </a:rPr>
+              <a:t>Interessados em integrar a referida comunidade;</a:t>
+            </a:r>
+          </a:p>
+          <a:p>
+            <a:pPr>
+              <a:lnSpc>
+                <a:spcPct val="160000"/>
+              </a:lnSpc>
+            </a:pPr>
+            <a:r>
+              <a:rPr lang="pt-PT" dirty="0">
+                <a:latin typeface="Nunito Sans" panose="00000500000000000000" pitchFamily="2" charset="0"/>
+              </a:rPr>
+              <a:t>Simpatizantes (familiares, amigos, colegas, etc.).</a:t>
+            </a:r>
+          </a:p>
+        </p:txBody>
+      </p:sp>
+      <p:pic>
+        <p:nvPicPr>
+          <p:cNvPr id="7" name="Content Placeholder 8">
+            <a:extLst>
+              <a:ext uri="{FF2B5EF4-FFF2-40B4-BE49-F238E27FC236}">
+                <a16:creationId xmlns:a16="http://schemas.microsoft.com/office/drawing/2014/main" id="{2F8A29B6-2042-427C-B218-E73BDD040FE3}"/>
+              </a:ext>
+            </a:extLst>
+          </p:cNvPr>
+          <p:cNvPicPr>
+            <a:picLocks noChangeAspect="1"/>
+          </p:cNvPicPr>
+          <p:nvPr/>
+        </p:nvPicPr>
+        <p:blipFill>
+          <a:blip r:embed="rId2">
+            <a:extLst>
+              <a:ext uri="{28A0092B-C50C-407E-A947-70E740481C1C}">
+                <a14:useLocalDpi xmlns:a14="http://schemas.microsoft.com/office/drawing/2010/main"/>
+              </a:ext>
+              <a:ext uri="{96DAC541-7B7A-43D3-8B79-37D633B846F1}">
+                <asvg:svgBlip xmlns:asvg="http://schemas.microsoft.com/office/drawing/2016/SVG/main" r:embed="rId3"/>
+              </a:ext>
+            </a:extLst>
+          </a:blip>
+          <a:srcRect/>
+          <a:stretch/>
+        </p:blipFill>
+        <p:spPr>
+          <a:xfrm>
+            <a:off x="11464889" y="4651893"/>
+            <a:ext cx="585531" cy="2082135"/>
+          </a:xfrm>
+          <a:prstGeom prst="rect">
+            <a:avLst/>
+          </a:prstGeom>
+        </p:spPr>
+      </p:pic>
+    </p:spTree>
+    <p:extLst>
+      <p:ext uri="{BB962C8B-B14F-4D97-AF65-F5344CB8AC3E}">
+        <p14:creationId xmlns:p14="http://schemas.microsoft.com/office/powerpoint/2010/main" val="4050068304"/>
+      </p:ext>
+    </p:extLst>
+  </p:cSld>
+  <p:clrMapOvr>
+    <a:masterClrMapping/>
+  </p:clrMapOvr>
+</p:sld>
+</file>
+
+<file path=ppt/slides/slide6.xml><?xml version="1.0" encoding="utf-8"?>
+<p:sld xmlns:a="http://schemas.openxmlformats.org/drawingml/2006/main" xmlns:r="http://schemas.openxmlformats.org/officeDocument/2006/relationships" xmlns:p="http://schemas.openxmlformats.org/presentationml/2006/main">
+  <p:cSld>
+    <p:spTree>
+      <p:nvGrpSpPr>
+        <p:cNvPr id="1" name=""/>
+        <p:cNvGrpSpPr/>
+        <p:nvPr/>
+      </p:nvGrpSpPr>
+      <p:grpSpPr>
+        <a:xfrm>
+          <a:off x="0" y="0"/>
+          <a:ext cx="0" cy="0"/>
+          <a:chOff x="0" y="0"/>
+          <a:chExt cx="0" cy="0"/>
+        </a:xfrm>
+      </p:grpSpPr>
+      <p:sp>
+        <p:nvSpPr>
+          <p:cNvPr id="2" name="Subtítulo 2">
+            <a:extLst>
+              <a:ext uri="{FF2B5EF4-FFF2-40B4-BE49-F238E27FC236}">
+                <a16:creationId xmlns:a16="http://schemas.microsoft.com/office/drawing/2014/main" id="{4C27BC55-4A1B-4219-AA2F-36521603FBD9}"/>
+              </a:ext>
+            </a:extLst>
+          </p:cNvPr>
+          <p:cNvSpPr txBox="1">
+            <a:spLocks/>
+          </p:cNvSpPr>
+          <p:nvPr/>
+        </p:nvSpPr>
+        <p:spPr>
+          <a:xfrm>
+            <a:off x="803864" y="822231"/>
+            <a:ext cx="10227659" cy="5949950"/>
+          </a:xfrm>
+          <a:prstGeom prst="rect">
+            <a:avLst/>
+          </a:prstGeom>
+        </p:spPr>
+        <p:txBody>
+          <a:bodyPr vert="horz" lIns="91440" tIns="45720" rIns="91440" bIns="45720" rtlCol="0">
+            <a:normAutofit/>
+          </a:bodyPr>
+          <a:lstStyle>
+            <a:lvl1pPr marL="182880" indent="-182880" algn="l" defTabSz="914400" rtl="0" eaLnBrk="1" latinLnBrk="0" hangingPunct="1">
+              <a:lnSpc>
+                <a:spcPct val="95000"/>
+              </a:lnSpc>
+              <a:spcBef>
+                <a:spcPts val="1400"/>
+              </a:spcBef>
+              <a:spcAft>
+                <a:spcPts val="200"/>
+              </a:spcAft>
+              <a:buClr>
+                <a:schemeClr val="accent1"/>
+              </a:buClr>
+              <a:buSzPct val="80000"/>
+              <a:buFont typeface="Arial" pitchFamily="34" charset="0"/>
+              <a:buChar char="•"/>
+              <a:defRPr sz="1800" kern="1200" spc="10" baseline="0">
+                <a:solidFill>
+                  <a:schemeClr val="tx1"/>
+                </a:solidFill>
+                <a:latin typeface="+mn-lt"/>
+                <a:ea typeface="+mn-ea"/>
+                <a:cs typeface="+mn-cs"/>
+              </a:defRPr>
+            </a:lvl1pPr>
+            <a:lvl2pPr marL="457200" indent="-182880" algn="l" defTabSz="914400" rtl="0" eaLnBrk="1" latinLnBrk="0" hangingPunct="1">
+              <a:lnSpc>
+                <a:spcPct val="90000"/>
+              </a:lnSpc>
+              <a:spcBef>
+                <a:spcPts val="300"/>
+              </a:spcBef>
+              <a:spcAft>
+                <a:spcPts val="300"/>
+              </a:spcAft>
+              <a:buClr>
+                <a:schemeClr val="accent1"/>
+              </a:buClr>
+              <a:buFont typeface="Wingdings 2" pitchFamily="18" charset="2"/>
+              <a:buChar char=""/>
+              <a:defRPr sz="1600" kern="1200">
+                <a:solidFill>
+                  <a:schemeClr val="tx1">
+                    <a:lumMod val="85000"/>
+                    <a:lumOff val="15000"/>
+                  </a:schemeClr>
+                </a:solidFill>
+                <a:latin typeface="+mn-lt"/>
+                <a:ea typeface="+mn-ea"/>
+                <a:cs typeface="+mn-cs"/>
+              </a:defRPr>
+            </a:lvl2pPr>
+            <a:lvl3pPr marL="731520" indent="-182880" algn="l" defTabSz="914400" rtl="0" eaLnBrk="1" latinLnBrk="0" hangingPunct="1">
+              <a:lnSpc>
+                <a:spcPct val="90000"/>
+              </a:lnSpc>
+              <a:spcBef>
+                <a:spcPts val="300"/>
+              </a:spcBef>
+              <a:spcAft>
+                <a:spcPts val="300"/>
+              </a:spcAft>
+              <a:buClr>
+                <a:schemeClr val="accent1"/>
+              </a:buClr>
+              <a:buFont typeface="Wingdings 2" pitchFamily="18" charset="2"/>
+              <a:buChar char=""/>
+              <a:defRPr sz="1400" kern="1200">
+                <a:solidFill>
+                  <a:schemeClr val="tx1">
+                    <a:lumMod val="85000"/>
+                    <a:lumOff val="15000"/>
+                  </a:schemeClr>
+                </a:solidFill>
+                <a:latin typeface="+mn-lt"/>
+                <a:ea typeface="+mn-ea"/>
+                <a:cs typeface="+mn-cs"/>
+              </a:defRPr>
+            </a:lvl3pPr>
+            <a:lvl4pPr marL="1005840" indent="-182880" algn="l" defTabSz="914400" rtl="0" eaLnBrk="1" latinLnBrk="0" hangingPunct="1">
+              <a:lnSpc>
+                <a:spcPct val="90000"/>
+              </a:lnSpc>
+              <a:spcBef>
+                <a:spcPts val="300"/>
+              </a:spcBef>
+              <a:spcAft>
+                <a:spcPts val="300"/>
+              </a:spcAft>
+              <a:buClr>
+                <a:schemeClr val="accent1"/>
+              </a:buClr>
+              <a:buFont typeface="Wingdings 2" pitchFamily="18" charset="2"/>
+              <a:buChar char=""/>
+              <a:defRPr sz="1400" kern="1200">
+                <a:solidFill>
+                  <a:schemeClr val="tx1">
+                    <a:lumMod val="85000"/>
+                    <a:lumOff val="15000"/>
+                  </a:schemeClr>
+                </a:solidFill>
+                <a:latin typeface="+mn-lt"/>
+                <a:ea typeface="+mn-ea"/>
+                <a:cs typeface="+mn-cs"/>
+              </a:defRPr>
+            </a:lvl4pPr>
+            <a:lvl5pPr marL="1280160" indent="-182880" algn="l" defTabSz="914400" rtl="0" eaLnBrk="1" latinLnBrk="0" hangingPunct="1">
+              <a:lnSpc>
+                <a:spcPct val="90000"/>
+              </a:lnSpc>
+              <a:spcBef>
+                <a:spcPts val="300"/>
+              </a:spcBef>
+              <a:spcAft>
+                <a:spcPts val="300"/>
+              </a:spcAft>
+              <a:buClr>
+                <a:schemeClr val="accent1"/>
+              </a:buClr>
+              <a:buFont typeface="Wingdings 2" pitchFamily="18" charset="2"/>
+              <a:buChar char=""/>
+              <a:defRPr sz="1400" kern="1200">
+                <a:solidFill>
+                  <a:schemeClr val="tx1">
+                    <a:lumMod val="85000"/>
+                    <a:lumOff val="15000"/>
+                  </a:schemeClr>
+                </a:solidFill>
+                <a:latin typeface="+mn-lt"/>
+                <a:ea typeface="+mn-ea"/>
+                <a:cs typeface="+mn-cs"/>
+              </a:defRPr>
+            </a:lvl5pPr>
+            <a:lvl6pPr marL="1600000" indent="-228600" algn="l" defTabSz="914400" rtl="0" eaLnBrk="1" latinLnBrk="0" hangingPunct="1">
+              <a:lnSpc>
+                <a:spcPct val="90000"/>
+              </a:lnSpc>
+              <a:spcBef>
+                <a:spcPts val="300"/>
+              </a:spcBef>
+              <a:spcAft>
+                <a:spcPts val="300"/>
+              </a:spcAft>
+              <a:buClr>
+                <a:schemeClr val="accent1"/>
+              </a:buClr>
+              <a:buFont typeface="Wingdings 2" pitchFamily="18" charset="2"/>
+              <a:buChar char=""/>
+              <a:defRPr sz="1400" kern="1200">
+                <a:solidFill>
+                  <a:schemeClr val="tx1">
+                    <a:lumMod val="85000"/>
+                    <a:lumOff val="15000"/>
+                  </a:schemeClr>
+                </a:solidFill>
+                <a:latin typeface="+mn-lt"/>
+                <a:ea typeface="+mn-ea"/>
+                <a:cs typeface="+mn-cs"/>
+              </a:defRPr>
+            </a:lvl6pPr>
+            <a:lvl7pPr marL="1900000" indent="-228600" algn="l" defTabSz="914400" rtl="0" eaLnBrk="1" latinLnBrk="0" hangingPunct="1">
+              <a:lnSpc>
+                <a:spcPct val="90000"/>
+              </a:lnSpc>
+              <a:spcBef>
+                <a:spcPts val="300"/>
+              </a:spcBef>
+              <a:spcAft>
+                <a:spcPts val="300"/>
+              </a:spcAft>
+              <a:buClr>
+                <a:schemeClr val="accent1"/>
+              </a:buClr>
+              <a:buFont typeface="Wingdings 2" pitchFamily="18" charset="2"/>
+              <a:buChar char=""/>
+              <a:defRPr sz="1400" kern="1200">
+                <a:solidFill>
+                  <a:schemeClr val="tx1">
+                    <a:lumMod val="85000"/>
+                    <a:lumOff val="15000"/>
+                  </a:schemeClr>
+                </a:solidFill>
+                <a:latin typeface="+mn-lt"/>
+                <a:ea typeface="+mn-ea"/>
+                <a:cs typeface="+mn-cs"/>
+              </a:defRPr>
+            </a:lvl7pPr>
+            <a:lvl8pPr marL="2200000" indent="-228600" algn="l" defTabSz="914400" rtl="0" eaLnBrk="1" latinLnBrk="0" hangingPunct="1">
+              <a:lnSpc>
+                <a:spcPct val="90000"/>
+              </a:lnSpc>
+              <a:spcBef>
+                <a:spcPts val="300"/>
+              </a:spcBef>
+              <a:spcAft>
+                <a:spcPts val="300"/>
+              </a:spcAft>
+              <a:buClr>
+                <a:schemeClr val="accent1"/>
+              </a:buClr>
+              <a:buFont typeface="Wingdings 2" pitchFamily="18" charset="2"/>
+              <a:buChar char=""/>
+              <a:defRPr sz="1400" kern="1200">
+                <a:solidFill>
+                  <a:schemeClr val="tx1">
+                    <a:lumMod val="85000"/>
+                    <a:lumOff val="15000"/>
+                  </a:schemeClr>
+                </a:solidFill>
+                <a:latin typeface="+mn-lt"/>
+                <a:ea typeface="+mn-ea"/>
+                <a:cs typeface="+mn-cs"/>
+              </a:defRPr>
+            </a:lvl8pPr>
+            <a:lvl9pPr marL="2500000" indent="-228600" algn="l" defTabSz="914400" rtl="0" eaLnBrk="1" latinLnBrk="0" hangingPunct="1">
+              <a:lnSpc>
+                <a:spcPct val="90000"/>
+              </a:lnSpc>
+              <a:spcBef>
+                <a:spcPts val="300"/>
+              </a:spcBef>
+              <a:spcAft>
+                <a:spcPts val="300"/>
+              </a:spcAft>
+              <a:buClr>
+                <a:schemeClr val="accent1"/>
+              </a:buClr>
+              <a:buFont typeface="Wingdings 2" pitchFamily="18" charset="2"/>
+              <a:buChar char=""/>
+              <a:defRPr sz="1400" kern="1200">
+                <a:solidFill>
+                  <a:schemeClr val="tx1">
+                    <a:lumMod val="85000"/>
+                    <a:lumOff val="15000"/>
+                  </a:schemeClr>
+                </a:solidFill>
+                <a:latin typeface="+mn-lt"/>
+                <a:ea typeface="+mn-ea"/>
+                <a:cs typeface="+mn-cs"/>
+              </a:defRPr>
+            </a:lvl9pPr>
+          </a:lstStyle>
+          <a:p>
+            <a:pPr marL="0" indent="0">
+              <a:buNone/>
+            </a:pPr>
+            <a:r>
+              <a:rPr lang="pt-PT" sz="2600" b="1" dirty="0">
+                <a:solidFill>
+                  <a:srgbClr val="1275B2"/>
+                </a:solidFill>
+                <a:latin typeface="Nunito Sans" panose="00000800000000000000" pitchFamily="2" charset="0"/>
+                <a:cs typeface="Arial" panose="020B0604020202020204" pitchFamily="34" charset="0"/>
+              </a:rPr>
+              <a:t>Funcionalidades</a:t>
+            </a:r>
+          </a:p>
+          <a:p>
+            <a:pPr>
+              <a:lnSpc>
+                <a:spcPct val="160000"/>
+              </a:lnSpc>
+            </a:pPr>
+            <a:r>
+              <a:rPr lang="pt-PT" dirty="0">
+                <a:latin typeface="Nunito Sans" panose="00000500000000000000" pitchFamily="2" charset="0"/>
+              </a:rPr>
+              <a:t>Registo e autenticação através de credenciais convencionais, conta Google ou conta Facebook;</a:t>
+            </a:r>
+          </a:p>
+          <a:p>
+            <a:pPr>
+              <a:lnSpc>
+                <a:spcPct val="160000"/>
+              </a:lnSpc>
+            </a:pPr>
+            <a:r>
+              <a:rPr lang="pt-PT" dirty="0">
+                <a:latin typeface="Nunito Sans" panose="00000500000000000000" pitchFamily="2" charset="0"/>
+              </a:rPr>
+              <a:t>Recuperação de credenciais através de um formulário dedicado;</a:t>
+            </a:r>
+          </a:p>
+          <a:p>
+            <a:pPr>
+              <a:lnSpc>
+                <a:spcPct val="160000"/>
+              </a:lnSpc>
+            </a:pPr>
+            <a:r>
+              <a:rPr lang="pt-PT" dirty="0">
+                <a:effectLst/>
+                <a:latin typeface="Nunito Sans" panose="00000500000000000000" pitchFamily="2" charset="0"/>
+              </a:rPr>
+              <a:t>Área pessoal ond</a:t>
+            </a:r>
+            <a:r>
+              <a:rPr lang="pt-PT" dirty="0">
+                <a:latin typeface="Nunito Sans" panose="00000500000000000000" pitchFamily="2" charset="0"/>
+              </a:rPr>
+              <a:t>e o utilizador é capaz de consultar os seus detalhes pessoais (avatar, nome de utilizador, grupo de escutismo, etc.) e terminar sessão na aplicação;</a:t>
+            </a:r>
+          </a:p>
+          <a:p>
+            <a:pPr>
+              <a:lnSpc>
+                <a:spcPct val="160000"/>
+              </a:lnSpc>
+            </a:pPr>
+            <a:r>
+              <a:rPr lang="pt-PT" dirty="0">
+                <a:latin typeface="Nunito Sans" panose="00000500000000000000" pitchFamily="2" charset="0"/>
+              </a:rPr>
+              <a:t>Vista onde são exibidas as últimas notícias relacionadas com o escutismo;</a:t>
+            </a:r>
+          </a:p>
+          <a:p>
+            <a:pPr>
+              <a:lnSpc>
+                <a:spcPct val="160000"/>
+              </a:lnSpc>
+            </a:pPr>
+            <a:r>
+              <a:rPr lang="pt-PT" dirty="0">
+                <a:latin typeface="Nunito Sans" panose="00000500000000000000" pitchFamily="2" charset="0"/>
+              </a:rPr>
+              <a:t>Calendário onde é possível consultar e criar eventos associados ao movimento escutista;</a:t>
+            </a:r>
+          </a:p>
+          <a:p>
+            <a:pPr>
+              <a:lnSpc>
+                <a:spcPct val="160000"/>
+              </a:lnSpc>
+            </a:pPr>
+            <a:r>
+              <a:rPr lang="pt-PT" dirty="0">
+                <a:latin typeface="Nunito Sans" panose="00000500000000000000" pitchFamily="2" charset="0"/>
+              </a:rPr>
+              <a:t>Consulta de grupos de escutismo nas proximidades, através de um mapa e respetivos mecanismos de localização;</a:t>
+            </a:r>
+          </a:p>
+          <a:p>
+            <a:pPr>
+              <a:lnSpc>
+                <a:spcPct val="160000"/>
+              </a:lnSpc>
+            </a:pPr>
+            <a:endParaRPr lang="pt-PT" dirty="0">
+              <a:effectLst/>
+              <a:latin typeface="Nunito Sans" panose="00000500000000000000" pitchFamily="2" charset="0"/>
+            </a:endParaRPr>
+          </a:p>
+        </p:txBody>
+      </p:sp>
+      <p:pic>
+        <p:nvPicPr>
+          <p:cNvPr id="7" name="Content Placeholder 8">
+            <a:extLst>
+              <a:ext uri="{FF2B5EF4-FFF2-40B4-BE49-F238E27FC236}">
+                <a16:creationId xmlns:a16="http://schemas.microsoft.com/office/drawing/2014/main" id="{2F8A29B6-2042-427C-B218-E73BDD040FE3}"/>
+              </a:ext>
+            </a:extLst>
+          </p:cNvPr>
+          <p:cNvPicPr>
+            <a:picLocks noChangeAspect="1"/>
+          </p:cNvPicPr>
+          <p:nvPr/>
+        </p:nvPicPr>
+        <p:blipFill>
+          <a:blip r:embed="rId2">
+            <a:extLst>
+              <a:ext uri="{28A0092B-C50C-407E-A947-70E740481C1C}">
+                <a14:useLocalDpi xmlns:a14="http://schemas.microsoft.com/office/drawing/2010/main"/>
+              </a:ext>
+              <a:ext uri="{96DAC541-7B7A-43D3-8B79-37D633B846F1}">
+                <asvg:svgBlip xmlns:asvg="http://schemas.microsoft.com/office/drawing/2016/SVG/main" r:embed="rId3"/>
+              </a:ext>
+            </a:extLst>
+          </a:blip>
+          <a:srcRect/>
+          <a:stretch/>
+        </p:blipFill>
+        <p:spPr>
+          <a:xfrm>
+            <a:off x="11464889" y="4651893"/>
+            <a:ext cx="585531" cy="2082135"/>
+          </a:xfrm>
+          <a:prstGeom prst="rect">
+            <a:avLst/>
+          </a:prstGeom>
+        </p:spPr>
+      </p:pic>
+    </p:spTree>
+    <p:extLst>
+      <p:ext uri="{BB962C8B-B14F-4D97-AF65-F5344CB8AC3E}">
+        <p14:creationId xmlns:p14="http://schemas.microsoft.com/office/powerpoint/2010/main" val="3825281448"/>
+      </p:ext>
+    </p:extLst>
+  </p:cSld>
+  <p:clrMapOvr>
+    <a:masterClrMapping/>
+  </p:clrMapOvr>
+</p:sld>
+</file>
+
+<file path=ppt/slides/slide7.xml><?xml version="1.0" encoding="utf-8"?>
+<p:sld xmlns:a="http://schemas.openxmlformats.org/drawingml/2006/main" xmlns:r="http://schemas.openxmlformats.org/officeDocument/2006/relationships" xmlns:p="http://schemas.openxmlformats.org/presentationml/2006/main">
+  <p:cSld>
+    <p:spTree>
+      <p:nvGrpSpPr>
+        <p:cNvPr id="1" name=""/>
+        <p:cNvGrpSpPr/>
+        <p:nvPr/>
+      </p:nvGrpSpPr>
+      <p:grpSpPr>
+        <a:xfrm>
+          <a:off x="0" y="0"/>
+          <a:ext cx="0" cy="0"/>
+          <a:chOff x="0" y="0"/>
+          <a:chExt cx="0" cy="0"/>
+        </a:xfrm>
+      </p:grpSpPr>
+      <p:sp>
+        <p:nvSpPr>
+          <p:cNvPr id="2" name="Subtítulo 2">
+            <a:extLst>
+              <a:ext uri="{FF2B5EF4-FFF2-40B4-BE49-F238E27FC236}">
+                <a16:creationId xmlns:a16="http://schemas.microsoft.com/office/drawing/2014/main" id="{4C27BC55-4A1B-4219-AA2F-36521603FBD9}"/>
+              </a:ext>
+            </a:extLst>
+          </p:cNvPr>
+          <p:cNvSpPr txBox="1">
+            <a:spLocks/>
+          </p:cNvSpPr>
+          <p:nvPr/>
+        </p:nvSpPr>
+        <p:spPr>
+          <a:xfrm>
+            <a:off x="803864" y="822231"/>
+            <a:ext cx="10227659" cy="5949950"/>
+          </a:xfrm>
+          <a:prstGeom prst="rect">
+            <a:avLst/>
+          </a:prstGeom>
+        </p:spPr>
+        <p:txBody>
+          <a:bodyPr vert="horz" lIns="91440" tIns="45720" rIns="91440" bIns="45720" rtlCol="0">
+            <a:normAutofit/>
+          </a:bodyPr>
+          <a:lstStyle>
+            <a:lvl1pPr marL="182880" indent="-182880" algn="l" defTabSz="914400" rtl="0" eaLnBrk="1" latinLnBrk="0" hangingPunct="1">
+              <a:lnSpc>
+                <a:spcPct val="95000"/>
+              </a:lnSpc>
+              <a:spcBef>
+                <a:spcPts val="1400"/>
+              </a:spcBef>
+              <a:spcAft>
+                <a:spcPts val="200"/>
+              </a:spcAft>
+              <a:buClr>
+                <a:schemeClr val="accent1"/>
+              </a:buClr>
+              <a:buSzPct val="80000"/>
+              <a:buFont typeface="Arial" pitchFamily="34" charset="0"/>
+              <a:buChar char="•"/>
+              <a:defRPr sz="1800" kern="1200" spc="10" baseline="0">
+                <a:solidFill>
+                  <a:schemeClr val="tx1"/>
+                </a:solidFill>
+                <a:latin typeface="+mn-lt"/>
+                <a:ea typeface="+mn-ea"/>
+                <a:cs typeface="+mn-cs"/>
+              </a:defRPr>
+            </a:lvl1pPr>
+            <a:lvl2pPr marL="457200" indent="-182880" algn="l" defTabSz="914400" rtl="0" eaLnBrk="1" latinLnBrk="0" hangingPunct="1">
+              <a:lnSpc>
+                <a:spcPct val="90000"/>
+              </a:lnSpc>
+              <a:spcBef>
+                <a:spcPts val="300"/>
+              </a:spcBef>
+              <a:spcAft>
+                <a:spcPts val="300"/>
+              </a:spcAft>
+              <a:buClr>
+                <a:schemeClr val="accent1"/>
+              </a:buClr>
+              <a:buFont typeface="Wingdings 2" pitchFamily="18" charset="2"/>
+              <a:buChar char=""/>
+              <a:defRPr sz="1600" kern="1200">
+                <a:solidFill>
+                  <a:schemeClr val="tx1">
+                    <a:lumMod val="85000"/>
+                    <a:lumOff val="15000"/>
+                  </a:schemeClr>
+                </a:solidFill>
+                <a:latin typeface="+mn-lt"/>
+                <a:ea typeface="+mn-ea"/>
+                <a:cs typeface="+mn-cs"/>
+              </a:defRPr>
+            </a:lvl2pPr>
+            <a:lvl3pPr marL="731520" indent="-182880" algn="l" defTabSz="914400" rtl="0" eaLnBrk="1" latinLnBrk="0" hangingPunct="1">
+              <a:lnSpc>
+                <a:spcPct val="90000"/>
+              </a:lnSpc>
+              <a:spcBef>
+                <a:spcPts val="300"/>
+              </a:spcBef>
+              <a:spcAft>
+                <a:spcPts val="300"/>
+              </a:spcAft>
+              <a:buClr>
+                <a:schemeClr val="accent1"/>
+              </a:buClr>
+              <a:buFont typeface="Wingdings 2" pitchFamily="18" charset="2"/>
+              <a:buChar char=""/>
+              <a:defRPr sz="1400" kern="1200">
+                <a:solidFill>
+                  <a:schemeClr val="tx1">
+                    <a:lumMod val="85000"/>
+                    <a:lumOff val="15000"/>
+                  </a:schemeClr>
+                </a:solidFill>
+                <a:latin typeface="+mn-lt"/>
+                <a:ea typeface="+mn-ea"/>
+                <a:cs typeface="+mn-cs"/>
+              </a:defRPr>
+            </a:lvl3pPr>
+            <a:lvl4pPr marL="1005840" indent="-182880" algn="l" defTabSz="914400" rtl="0" eaLnBrk="1" latinLnBrk="0" hangingPunct="1">
+              <a:lnSpc>
+                <a:spcPct val="90000"/>
+              </a:lnSpc>
+              <a:spcBef>
+                <a:spcPts val="300"/>
+              </a:spcBef>
+              <a:spcAft>
+                <a:spcPts val="300"/>
+              </a:spcAft>
+              <a:buClr>
+                <a:schemeClr val="accent1"/>
+              </a:buClr>
+              <a:buFont typeface="Wingdings 2" pitchFamily="18" charset="2"/>
+              <a:buChar char=""/>
+              <a:defRPr sz="1400" kern="1200">
+                <a:solidFill>
+                  <a:schemeClr val="tx1">
+                    <a:lumMod val="85000"/>
+                    <a:lumOff val="15000"/>
+                  </a:schemeClr>
+                </a:solidFill>
+                <a:latin typeface="+mn-lt"/>
+                <a:ea typeface="+mn-ea"/>
+                <a:cs typeface="+mn-cs"/>
+              </a:defRPr>
+            </a:lvl4pPr>
+            <a:lvl5pPr marL="1280160" indent="-182880" algn="l" defTabSz="914400" rtl="0" eaLnBrk="1" latinLnBrk="0" hangingPunct="1">
+              <a:lnSpc>
+                <a:spcPct val="90000"/>
+              </a:lnSpc>
+              <a:spcBef>
+                <a:spcPts val="300"/>
+              </a:spcBef>
+              <a:spcAft>
+                <a:spcPts val="300"/>
+              </a:spcAft>
+              <a:buClr>
+                <a:schemeClr val="accent1"/>
+              </a:buClr>
+              <a:buFont typeface="Wingdings 2" pitchFamily="18" charset="2"/>
+              <a:buChar char=""/>
+              <a:defRPr sz="1400" kern="1200">
+                <a:solidFill>
+                  <a:schemeClr val="tx1">
+                    <a:lumMod val="85000"/>
+                    <a:lumOff val="15000"/>
+                  </a:schemeClr>
+                </a:solidFill>
+                <a:latin typeface="+mn-lt"/>
+                <a:ea typeface="+mn-ea"/>
+                <a:cs typeface="+mn-cs"/>
+              </a:defRPr>
+            </a:lvl5pPr>
+            <a:lvl6pPr marL="1600000" indent="-228600" algn="l" defTabSz="914400" rtl="0" eaLnBrk="1" latinLnBrk="0" hangingPunct="1">
+              <a:lnSpc>
+                <a:spcPct val="90000"/>
+              </a:lnSpc>
+              <a:spcBef>
+                <a:spcPts val="300"/>
+              </a:spcBef>
+              <a:spcAft>
+                <a:spcPts val="300"/>
+              </a:spcAft>
+              <a:buClr>
+                <a:schemeClr val="accent1"/>
+              </a:buClr>
+              <a:buFont typeface="Wingdings 2" pitchFamily="18" charset="2"/>
+              <a:buChar char=""/>
+              <a:defRPr sz="1400" kern="1200">
+                <a:solidFill>
+                  <a:schemeClr val="tx1">
+                    <a:lumMod val="85000"/>
+                    <a:lumOff val="15000"/>
+                  </a:schemeClr>
+                </a:solidFill>
+                <a:latin typeface="+mn-lt"/>
+                <a:ea typeface="+mn-ea"/>
+                <a:cs typeface="+mn-cs"/>
+              </a:defRPr>
+            </a:lvl6pPr>
+            <a:lvl7pPr marL="1900000" indent="-228600" algn="l" defTabSz="914400" rtl="0" eaLnBrk="1" latinLnBrk="0" hangingPunct="1">
+              <a:lnSpc>
+                <a:spcPct val="90000"/>
+              </a:lnSpc>
+              <a:spcBef>
+                <a:spcPts val="300"/>
+              </a:spcBef>
+              <a:spcAft>
+                <a:spcPts val="300"/>
+              </a:spcAft>
+              <a:buClr>
+                <a:schemeClr val="accent1"/>
+              </a:buClr>
+              <a:buFont typeface="Wingdings 2" pitchFamily="18" charset="2"/>
+              <a:buChar char=""/>
+              <a:defRPr sz="1400" kern="1200">
+                <a:solidFill>
+                  <a:schemeClr val="tx1">
+                    <a:lumMod val="85000"/>
+                    <a:lumOff val="15000"/>
+                  </a:schemeClr>
+                </a:solidFill>
+                <a:latin typeface="+mn-lt"/>
+                <a:ea typeface="+mn-ea"/>
+                <a:cs typeface="+mn-cs"/>
+              </a:defRPr>
+            </a:lvl7pPr>
+            <a:lvl8pPr marL="2200000" indent="-228600" algn="l" defTabSz="914400" rtl="0" eaLnBrk="1" latinLnBrk="0" hangingPunct="1">
+              <a:lnSpc>
+                <a:spcPct val="90000"/>
+              </a:lnSpc>
+              <a:spcBef>
+                <a:spcPts val="300"/>
+              </a:spcBef>
+              <a:spcAft>
+                <a:spcPts val="300"/>
+              </a:spcAft>
+              <a:buClr>
+                <a:schemeClr val="accent1"/>
+              </a:buClr>
+              <a:buFont typeface="Wingdings 2" pitchFamily="18" charset="2"/>
+              <a:buChar char=""/>
+              <a:defRPr sz="1400" kern="1200">
+                <a:solidFill>
+                  <a:schemeClr val="tx1">
+                    <a:lumMod val="85000"/>
+                    <a:lumOff val="15000"/>
+                  </a:schemeClr>
+                </a:solidFill>
+                <a:latin typeface="+mn-lt"/>
+                <a:ea typeface="+mn-ea"/>
+                <a:cs typeface="+mn-cs"/>
+              </a:defRPr>
+            </a:lvl8pPr>
+            <a:lvl9pPr marL="2500000" indent="-228600" algn="l" defTabSz="914400" rtl="0" eaLnBrk="1" latinLnBrk="0" hangingPunct="1">
+              <a:lnSpc>
+                <a:spcPct val="90000"/>
+              </a:lnSpc>
+              <a:spcBef>
+                <a:spcPts val="300"/>
+              </a:spcBef>
+              <a:spcAft>
+                <a:spcPts val="300"/>
+              </a:spcAft>
+              <a:buClr>
+                <a:schemeClr val="accent1"/>
+              </a:buClr>
+              <a:buFont typeface="Wingdings 2" pitchFamily="18" charset="2"/>
+              <a:buChar char=""/>
+              <a:defRPr sz="1400" kern="1200">
+                <a:solidFill>
+                  <a:schemeClr val="tx1">
+                    <a:lumMod val="85000"/>
+                    <a:lumOff val="15000"/>
+                  </a:schemeClr>
+                </a:solidFill>
+                <a:latin typeface="+mn-lt"/>
+                <a:ea typeface="+mn-ea"/>
+                <a:cs typeface="+mn-cs"/>
+              </a:defRPr>
+            </a:lvl9pPr>
+          </a:lstStyle>
+          <a:p>
+            <a:pPr marL="0" indent="0">
+              <a:buNone/>
+            </a:pPr>
+            <a:r>
+              <a:rPr lang="pt-PT" sz="2600" b="1" dirty="0">
+                <a:solidFill>
+                  <a:srgbClr val="1275B2"/>
+                </a:solidFill>
+                <a:latin typeface="Nunito Sans" panose="00000800000000000000" pitchFamily="2" charset="0"/>
+                <a:cs typeface="Arial" panose="020B0604020202020204" pitchFamily="34" charset="0"/>
+              </a:rPr>
+              <a:t>Funcionalidades</a:t>
+            </a:r>
+          </a:p>
+          <a:p>
+            <a:pPr>
+              <a:lnSpc>
+                <a:spcPct val="160000"/>
+              </a:lnSpc>
+            </a:pPr>
+            <a:r>
+              <a:rPr lang="pt-PT" dirty="0">
+                <a:latin typeface="Nunito Sans" panose="00000500000000000000" pitchFamily="2" charset="0"/>
+              </a:rPr>
+              <a:t>Galeria que inclui álbuns de fotografias. Os mesmos encontram-se associados a eventos;</a:t>
+            </a:r>
+          </a:p>
+          <a:p>
+            <a:pPr>
+              <a:lnSpc>
+                <a:spcPct val="160000"/>
+              </a:lnSpc>
+            </a:pPr>
+            <a:r>
+              <a:rPr lang="pt-PT" dirty="0">
+                <a:latin typeface="Nunito Sans" panose="00000500000000000000" pitchFamily="2" charset="0"/>
+              </a:rPr>
+              <a:t>Vista onde é apresentado o contexto e autores da aplicação.</a:t>
+            </a:r>
+          </a:p>
+          <a:p>
+            <a:pPr>
+              <a:lnSpc>
+                <a:spcPct val="160000"/>
+              </a:lnSpc>
+            </a:pPr>
+            <a:endParaRPr lang="pt-PT" dirty="0">
+              <a:latin typeface="Nunito Sans" panose="00000500000000000000" pitchFamily="2" charset="0"/>
+            </a:endParaRPr>
+          </a:p>
+          <a:p>
+            <a:pPr>
+              <a:lnSpc>
+                <a:spcPct val="160000"/>
+              </a:lnSpc>
+            </a:pPr>
+            <a:endParaRPr lang="pt-PT" dirty="0">
+              <a:effectLst/>
+              <a:latin typeface="Nunito Sans" panose="00000500000000000000" pitchFamily="2" charset="0"/>
+            </a:endParaRPr>
+          </a:p>
+        </p:txBody>
+      </p:sp>
+      <p:pic>
+        <p:nvPicPr>
+          <p:cNvPr id="7" name="Content Placeholder 8">
+            <a:extLst>
+              <a:ext uri="{FF2B5EF4-FFF2-40B4-BE49-F238E27FC236}">
+                <a16:creationId xmlns:a16="http://schemas.microsoft.com/office/drawing/2014/main" id="{2F8A29B6-2042-427C-B218-E73BDD040FE3}"/>
+              </a:ext>
+            </a:extLst>
+          </p:cNvPr>
+          <p:cNvPicPr>
+            <a:picLocks noChangeAspect="1"/>
+          </p:cNvPicPr>
+          <p:nvPr/>
+        </p:nvPicPr>
+        <p:blipFill>
+          <a:blip r:embed="rId2">
+            <a:extLst>
+              <a:ext uri="{28A0092B-C50C-407E-A947-70E740481C1C}">
+                <a14:useLocalDpi xmlns:a14="http://schemas.microsoft.com/office/drawing/2010/main"/>
+              </a:ext>
+              <a:ext uri="{96DAC541-7B7A-43D3-8B79-37D633B846F1}">
+                <asvg:svgBlip xmlns:asvg="http://schemas.microsoft.com/office/drawing/2016/SVG/main" r:embed="rId3"/>
+              </a:ext>
+            </a:extLst>
+          </a:blip>
+          <a:srcRect/>
+          <a:stretch/>
+        </p:blipFill>
+        <p:spPr>
+          <a:xfrm>
+            <a:off x="11464889" y="4651893"/>
+            <a:ext cx="585531" cy="2082135"/>
+          </a:xfrm>
+          <a:prstGeom prst="rect">
+            <a:avLst/>
+          </a:prstGeom>
+        </p:spPr>
+      </p:pic>
+    </p:spTree>
+    <p:extLst>
+      <p:ext uri="{BB962C8B-B14F-4D97-AF65-F5344CB8AC3E}">
+        <p14:creationId xmlns:p14="http://schemas.microsoft.com/office/powerpoint/2010/main" val="3581368165"/>
+      </p:ext>
+    </p:extLst>
+  </p:cSld>
+  <p:clrMapOvr>
+    <a:masterClrMapping/>
+  </p:clrMapOvr>
+</p:sld>
+</file>
+
+<file path=ppt/slides/slide8.xml><?xml version="1.0" encoding="utf-8"?>
+<p:sld xmlns:a="http://schemas.openxmlformats.org/drawingml/2006/main" xmlns:r="http://schemas.openxmlformats.org/officeDocument/2006/relationships" xmlns:p="http://schemas.openxmlformats.org/presentationml/2006/main">
+  <p:cSld>
+    <p:spTree>
+      <p:nvGrpSpPr>
+        <p:cNvPr id="1" name=""/>
+        <p:cNvGrpSpPr/>
+        <p:nvPr/>
+      </p:nvGrpSpPr>
+      <p:grpSpPr>
+        <a:xfrm>
+          <a:off x="0" y="0"/>
+          <a:ext cx="0" cy="0"/>
+          <a:chOff x="0" y="0"/>
+          <a:chExt cx="0" cy="0"/>
+        </a:xfrm>
+      </p:grpSpPr>
+      <p:sp>
+        <p:nvSpPr>
+          <p:cNvPr id="2" name="Title 1">
+            <a:extLst>
+              <a:ext uri="{FF2B5EF4-FFF2-40B4-BE49-F238E27FC236}">
+                <a16:creationId xmlns:a16="http://schemas.microsoft.com/office/drawing/2014/main" id="{540DD248-1121-4389-9411-B7B8B8FF5AEB}"/>
+              </a:ext>
+            </a:extLst>
+          </p:cNvPr>
+          <p:cNvSpPr>
+            <a:spLocks noGrp="1"/>
+          </p:cNvSpPr>
+          <p:nvPr>
+            <p:ph type="title"/>
+          </p:nvPr>
+        </p:nvSpPr>
+        <p:spPr>
+          <a:xfrm>
+            <a:off x="770040" y="2792690"/>
+            <a:ext cx="10541728" cy="1272620"/>
+          </a:xfrm>
+        </p:spPr>
+        <p:txBody>
+          <a:bodyPr>
+            <a:normAutofit/>
+          </a:bodyPr>
+          <a:lstStyle/>
+          <a:p>
+            <a:r>
+              <a:rPr lang="en-US" sz="4800" dirty="0">
+                <a:solidFill>
+                  <a:srgbClr val="1275B2"/>
+                </a:solidFill>
+                <a:latin typeface="Nunito Sans" panose="00000800000000000000" pitchFamily="2" charset="0"/>
+                <a:cs typeface="Arial" panose="020B0604020202020204" pitchFamily="34" charset="0"/>
+              </a:rPr>
+              <a:t>Demonstração</a:t>
+            </a:r>
+            <a:endParaRPr lang="pt-PT" sz="4800" dirty="0">
+              <a:solidFill>
+                <a:srgbClr val="1275B2"/>
+              </a:solidFill>
+              <a:latin typeface="Nunito Sans" panose="00000800000000000000" pitchFamily="2" charset="0"/>
+              <a:cs typeface="Arial" panose="020B0604020202020204" pitchFamily="34" charset="0"/>
+            </a:endParaRPr>
+          </a:p>
+        </p:txBody>
+      </p:sp>
+      <p:pic>
+        <p:nvPicPr>
+          <p:cNvPr id="7" name="Content Placeholder 8">
+            <a:extLst>
+              <a:ext uri="{FF2B5EF4-FFF2-40B4-BE49-F238E27FC236}">
+                <a16:creationId xmlns:a16="http://schemas.microsoft.com/office/drawing/2014/main" id="{CABB28E9-B495-4BA6-9403-B1A50DAE13A7}"/>
+              </a:ext>
+            </a:extLst>
+          </p:cNvPr>
+          <p:cNvPicPr>
+            <a:picLocks noChangeAspect="1"/>
+          </p:cNvPicPr>
+          <p:nvPr/>
+        </p:nvPicPr>
+        <p:blipFill>
+          <a:blip r:embed="rId2">
+            <a:extLst>
+              <a:ext uri="{28A0092B-C50C-407E-A947-70E740481C1C}">
+                <a14:useLocalDpi xmlns:a14="http://schemas.microsoft.com/office/drawing/2010/main"/>
+              </a:ext>
+              <a:ext uri="{96DAC541-7B7A-43D3-8B79-37D633B846F1}">
+                <asvg:svgBlip xmlns:asvg="http://schemas.microsoft.com/office/drawing/2016/SVG/main" r:embed="rId3"/>
+              </a:ext>
+            </a:extLst>
+          </a:blip>
+          <a:srcRect/>
+          <a:stretch/>
+        </p:blipFill>
+        <p:spPr>
+          <a:xfrm>
+            <a:off x="11464889" y="4651893"/>
+            <a:ext cx="585531" cy="2082135"/>
+          </a:xfrm>
+          <a:prstGeom prst="rect">
+            <a:avLst/>
+          </a:prstGeom>
+        </p:spPr>
+      </p:pic>
+    </p:spTree>
+    <p:extLst>
+      <p:ext uri="{BB962C8B-B14F-4D97-AF65-F5344CB8AC3E}">
+        <p14:creationId xmlns:p14="http://schemas.microsoft.com/office/powerpoint/2010/main" val="3241235506"/>
+      </p:ext>
+    </p:extLst>
+  </p:cSld>
+  <p:clrMapOvr>
+    <a:masterClrMapping/>
+  </p:clrMapOvr>
+</p:sld>
+</file>
+
+<file path=ppt/slides/slide9.xml><?xml version="1.0" encoding="utf-8"?>
+<p:sld xmlns:a="http://schemas.openxmlformats.org/drawingml/2006/main" xmlns:r="http://schemas.openxmlformats.org/officeDocument/2006/relationships" xmlns:p="http://schemas.openxmlformats.org/presentationml/2006/main">
+  <p:cSld>
+    <p:spTree>
+      <p:nvGrpSpPr>
+        <p:cNvPr id="1" name=""/>
+        <p:cNvGrpSpPr/>
+        <p:nvPr/>
+      </p:nvGrpSpPr>
+      <p:grpSpPr>
+        <a:xfrm>
+          <a:off x="0" y="0"/>
+          <a:ext cx="0" cy="0"/>
+          <a:chOff x="0" y="0"/>
+          <a:chExt cx="0" cy="0"/>
+        </a:xfrm>
+      </p:grpSpPr>
+      <p:sp>
+        <p:nvSpPr>
+          <p:cNvPr id="2" name="Title 1">
+            <a:extLst>
+              <a:ext uri="{FF2B5EF4-FFF2-40B4-BE49-F238E27FC236}">
+                <a16:creationId xmlns:a16="http://schemas.microsoft.com/office/drawing/2014/main" id="{540DD248-1121-4389-9411-B7B8B8FF5AEB}"/>
+              </a:ext>
+            </a:extLst>
+          </p:cNvPr>
+          <p:cNvSpPr>
+            <a:spLocks noGrp="1"/>
+          </p:cNvSpPr>
+          <p:nvPr>
+            <p:ph type="title"/>
+          </p:nvPr>
+        </p:nvSpPr>
+        <p:spPr>
+          <a:xfrm>
+            <a:off x="3342314" y="3159136"/>
+            <a:ext cx="5507372" cy="539728"/>
+          </a:xfrm>
+        </p:spPr>
+        <p:txBody>
+          <a:bodyPr>
+            <a:normAutofit/>
+          </a:bodyPr>
+          <a:lstStyle/>
+          <a:p>
+            <a:pPr algn="ctr"/>
+            <a:r>
+              <a:rPr lang="en-US" sz="2000" spc="0" dirty="0">
+                <a:solidFill>
+                  <a:srgbClr val="61C461"/>
+                </a:solidFill>
+                <a:latin typeface="Nunito Sans" panose="00000800000000000000" pitchFamily="2" charset="0"/>
+                <a:cs typeface="Arial" panose="020B0604020202020204" pitchFamily="34" charset="0"/>
+                <a:hlinkClick r:id="rId2">
+                  <a:extLst>
+                    <a:ext uri="{A12FA001-AC4F-418D-AE19-62706E023703}">
+                      <ahyp:hlinkClr xmlns:ahyp="http://schemas.microsoft.com/office/drawing/2018/hyperlinkcolor" val="tx"/>
+                    </a:ext>
+                  </a:extLst>
+                </a:hlinkClick>
+              </a:rPr>
+              <a:t>https://github.com/ibbgomes/escutas/releases</a:t>
+            </a:r>
+            <a:endParaRPr lang="pt-PT" sz="2000" i="1" spc="0" dirty="0">
+              <a:solidFill>
+                <a:srgbClr val="61C461"/>
+              </a:solidFill>
+              <a:latin typeface="Nunito Sans" panose="00000800000000000000" pitchFamily="2" charset="0"/>
+              <a:cs typeface="Arial" panose="020B0604020202020204" pitchFamily="34" charset="0"/>
+            </a:endParaRPr>
+          </a:p>
+        </p:txBody>
+      </p:sp>
+      <p:pic>
+        <p:nvPicPr>
+          <p:cNvPr id="6" name="Content Placeholder 8">
+            <a:extLst>
+              <a:ext uri="{FF2B5EF4-FFF2-40B4-BE49-F238E27FC236}">
+                <a16:creationId xmlns:a16="http://schemas.microsoft.com/office/drawing/2014/main" id="{257E92B1-94DE-4A3B-8323-035ACB5CFCA7}"/>
+              </a:ext>
+            </a:extLst>
+          </p:cNvPr>
+          <p:cNvPicPr>
+            <a:picLocks noChangeAspect="1"/>
+          </p:cNvPicPr>
+          <p:nvPr/>
+        </p:nvPicPr>
+        <p:blipFill>
+          <a:blip r:embed="rId3">
+            <a:extLst>
+              <a:ext uri="{28A0092B-C50C-407E-A947-70E740481C1C}">
+                <a14:useLocalDpi xmlns:a14="http://schemas.microsoft.com/office/drawing/2010/main"/>
+              </a:ext>
+              <a:ext uri="{96DAC541-7B7A-43D3-8B79-37D633B846F1}">
+                <asvg:svgBlip xmlns:asvg="http://schemas.microsoft.com/office/drawing/2016/SVG/main" r:embed="rId4"/>
+              </a:ext>
+            </a:extLst>
+          </a:blip>
+          <a:srcRect/>
+          <a:stretch/>
+        </p:blipFill>
+        <p:spPr>
+          <a:xfrm>
+            <a:off x="11464889" y="4651893"/>
+            <a:ext cx="585531" cy="2082135"/>
+          </a:xfrm>
+          <a:prstGeom prst="rect">
+            <a:avLst/>
+          </a:prstGeom>
+        </p:spPr>
+      </p:pic>
+    </p:spTree>
+    <p:extLst>
+      <p:ext uri="{BB962C8B-B14F-4D97-AF65-F5344CB8AC3E}">
+        <p14:creationId xmlns:p14="http://schemas.microsoft.com/office/powerpoint/2010/main" val="2524273400"/>
       </p:ext>
     </p:extLst>
   </p:cSld>

</xml_diff>

<commit_message>
Update presentation. Remove unneeded documentation
</commit_message>
<xml_diff>
--- a/docs/presentation.pptx
+++ b/docs/presentation.pptx
@@ -5,7 +5,7 @@
     <p:sldMasterId id="2147483737" r:id="rId1"/>
   </p:sldMasterIdLst>
   <p:notesMasterIdLst>
-    <p:notesMasterId r:id="rId11"/>
+    <p:notesMasterId r:id="rId12"/>
   </p:notesMasterIdLst>
   <p:sldIdLst>
     <p:sldId id="257" r:id="rId2"/>
@@ -14,9 +14,10 @@
     <p:sldId id="280" r:id="rId5"/>
     <p:sldId id="281" r:id="rId6"/>
     <p:sldId id="283" r:id="rId7"/>
-    <p:sldId id="346" r:id="rId8"/>
-    <p:sldId id="278" r:id="rId9"/>
-    <p:sldId id="345" r:id="rId10"/>
+    <p:sldId id="347" r:id="rId8"/>
+    <p:sldId id="346" r:id="rId9"/>
+    <p:sldId id="278" r:id="rId10"/>
+    <p:sldId id="345" r:id="rId11"/>
   </p:sldIdLst>
   <p:sldSz cx="12192000" cy="6858000"/>
   <p:notesSz cx="6858000" cy="9144000"/>
@@ -216,7 +217,7 @@
           <a:p>
             <a:fld id="{7068CBD5-E1ED-416D-8548-E29F527133A0}" type="datetimeFigureOut">
               <a:rPr lang="pt-PT" smtClean="0"/>
-              <a:t>02/06/2021</a:t>
+              <a:t>08/06/2021</a:t>
             </a:fld>
             <a:endParaRPr lang="pt-PT" dirty="0"/>
           </a:p>
@@ -375,7 +376,7 @@
           <a:p>
             <a:fld id="{F47A43E1-47A7-492F-A3D8-4AF87E685878}" type="slidenum">
               <a:rPr lang="pt-PT" smtClean="0"/>
-              <a:t>‹#›</a:t>
+              <a:t>‹nº›</a:t>
             </a:fld>
             <a:endParaRPr lang="pt-PT" dirty="0"/>
           </a:p>
@@ -652,7 +653,7 @@
           <a:p>
             <a:fld id="{DE2DA490-63B1-4B7A-B9AD-9A630F5DB54A}" type="datetimeFigureOut">
               <a:rPr lang="pt-PT" smtClean="0"/>
-              <a:t>02/06/2021</a:t>
+              <a:t>08/06/2021</a:t>
             </a:fld>
             <a:endParaRPr lang="pt-PT" dirty="0"/>
           </a:p>
@@ -714,7 +715,7 @@
           <a:p>
             <a:fld id="{C2E14CD9-B4E2-40A0-9B57-2B41076E5BFE}" type="slidenum">
               <a:rPr lang="pt-PT" smtClean="0"/>
-              <a:t>‹#›</a:t>
+              <a:t>‹nº›</a:t>
             </a:fld>
             <a:endParaRPr lang="pt-PT" dirty="0"/>
           </a:p>
@@ -880,7 +881,7 @@
           <a:p>
             <a:fld id="{DE2DA490-63B1-4B7A-B9AD-9A630F5DB54A}" type="datetimeFigureOut">
               <a:rPr lang="pt-PT" smtClean="0"/>
-              <a:t>02/06/2021</a:t>
+              <a:t>08/06/2021</a:t>
             </a:fld>
             <a:endParaRPr lang="pt-PT" dirty="0"/>
           </a:p>
@@ -922,7 +923,7 @@
           <a:p>
             <a:fld id="{C2E14CD9-B4E2-40A0-9B57-2B41076E5BFE}" type="slidenum">
               <a:rPr lang="pt-PT" smtClean="0"/>
-              <a:t>‹#›</a:t>
+              <a:t>‹nº›</a:t>
             </a:fld>
             <a:endParaRPr lang="pt-PT" dirty="0"/>
           </a:p>
@@ -1060,7 +1061,7 @@
           <a:p>
             <a:fld id="{DE2DA490-63B1-4B7A-B9AD-9A630F5DB54A}" type="datetimeFigureOut">
               <a:rPr lang="pt-PT" smtClean="0"/>
-              <a:t>02/06/2021</a:t>
+              <a:t>08/06/2021</a:t>
             </a:fld>
             <a:endParaRPr lang="pt-PT" dirty="0"/>
           </a:p>
@@ -1102,7 +1103,7 @@
           <a:p>
             <a:fld id="{C2E14CD9-B4E2-40A0-9B57-2B41076E5BFE}" type="slidenum">
               <a:rPr lang="pt-PT" smtClean="0"/>
-              <a:t>‹#›</a:t>
+              <a:t>‹nº›</a:t>
             </a:fld>
             <a:endParaRPr lang="pt-PT" dirty="0"/>
           </a:p>
@@ -1230,7 +1231,7 @@
           <a:p>
             <a:fld id="{DE2DA490-63B1-4B7A-B9AD-9A630F5DB54A}" type="datetimeFigureOut">
               <a:rPr lang="pt-PT" smtClean="0"/>
-              <a:t>02/06/2021</a:t>
+              <a:t>08/06/2021</a:t>
             </a:fld>
             <a:endParaRPr lang="pt-PT" dirty="0"/>
           </a:p>
@@ -1272,7 +1273,7 @@
           <a:p>
             <a:fld id="{C2E14CD9-B4E2-40A0-9B57-2B41076E5BFE}" type="slidenum">
               <a:rPr lang="pt-PT" smtClean="0"/>
-              <a:t>‹#›</a:t>
+              <a:t>‹nº›</a:t>
             </a:fld>
             <a:endParaRPr lang="pt-PT" dirty="0"/>
           </a:p>
@@ -1484,7 +1485,7 @@
           <a:p>
             <a:fld id="{DE2DA490-63B1-4B7A-B9AD-9A630F5DB54A}" type="datetimeFigureOut">
               <a:rPr lang="pt-PT" smtClean="0"/>
-              <a:t>02/06/2021</a:t>
+              <a:t>08/06/2021</a:t>
             </a:fld>
             <a:endParaRPr lang="pt-PT" dirty="0"/>
           </a:p>
@@ -1526,7 +1527,7 @@
           <a:p>
             <a:fld id="{C2E14CD9-B4E2-40A0-9B57-2B41076E5BFE}" type="slidenum">
               <a:rPr lang="pt-PT" smtClean="0"/>
-              <a:t>‹#›</a:t>
+              <a:t>‹nº›</a:t>
             </a:fld>
             <a:endParaRPr lang="pt-PT" dirty="0"/>
           </a:p>
@@ -1810,7 +1811,7 @@
           <a:p>
             <a:fld id="{DE2DA490-63B1-4B7A-B9AD-9A630F5DB54A}" type="datetimeFigureOut">
               <a:rPr lang="pt-PT" smtClean="0"/>
-              <a:t>02/06/2021</a:t>
+              <a:t>08/06/2021</a:t>
             </a:fld>
             <a:endParaRPr lang="pt-PT" dirty="0"/>
           </a:p>
@@ -1852,7 +1853,7 @@
           <a:p>
             <a:fld id="{C2E14CD9-B4E2-40A0-9B57-2B41076E5BFE}" type="slidenum">
               <a:rPr lang="pt-PT" smtClean="0"/>
-              <a:t>‹#›</a:t>
+              <a:t>‹nº›</a:t>
             </a:fld>
             <a:endParaRPr lang="pt-PT" dirty="0"/>
           </a:p>
@@ -2261,7 +2262,7 @@
           <a:p>
             <a:fld id="{DE2DA490-63B1-4B7A-B9AD-9A630F5DB54A}" type="datetimeFigureOut">
               <a:rPr lang="pt-PT" smtClean="0"/>
-              <a:t>02/06/2021</a:t>
+              <a:t>08/06/2021</a:t>
             </a:fld>
             <a:endParaRPr lang="pt-PT" dirty="0"/>
           </a:p>
@@ -2303,7 +2304,7 @@
           <a:p>
             <a:fld id="{C2E14CD9-B4E2-40A0-9B57-2B41076E5BFE}" type="slidenum">
               <a:rPr lang="pt-PT" smtClean="0"/>
-              <a:t>‹#›</a:t>
+              <a:t>‹nº›</a:t>
             </a:fld>
             <a:endParaRPr lang="pt-PT" dirty="0"/>
           </a:p>
@@ -2379,7 +2380,7 @@
           <a:p>
             <a:fld id="{DE2DA490-63B1-4B7A-B9AD-9A630F5DB54A}" type="datetimeFigureOut">
               <a:rPr lang="pt-PT" smtClean="0"/>
-              <a:t>02/06/2021</a:t>
+              <a:t>08/06/2021</a:t>
             </a:fld>
             <a:endParaRPr lang="pt-PT" dirty="0"/>
           </a:p>
@@ -2421,7 +2422,7 @@
           <a:p>
             <a:fld id="{C2E14CD9-B4E2-40A0-9B57-2B41076E5BFE}" type="slidenum">
               <a:rPr lang="pt-PT" smtClean="0"/>
-              <a:t>‹#›</a:t>
+              <a:t>‹nº›</a:t>
             </a:fld>
             <a:endParaRPr lang="pt-PT" dirty="0"/>
           </a:p>
@@ -2474,7 +2475,7 @@
           <a:p>
             <a:fld id="{DE2DA490-63B1-4B7A-B9AD-9A630F5DB54A}" type="datetimeFigureOut">
               <a:rPr lang="pt-PT" smtClean="0"/>
-              <a:t>02/06/2021</a:t>
+              <a:t>08/06/2021</a:t>
             </a:fld>
             <a:endParaRPr lang="pt-PT" dirty="0"/>
           </a:p>
@@ -2516,7 +2517,7 @@
           <a:p>
             <a:fld id="{C2E14CD9-B4E2-40A0-9B57-2B41076E5BFE}" type="slidenum">
               <a:rPr lang="pt-PT" smtClean="0"/>
-              <a:t>‹#›</a:t>
+              <a:t>‹nº›</a:t>
             </a:fld>
             <a:endParaRPr lang="pt-PT" dirty="0"/>
           </a:p>
@@ -2761,7 +2762,7 @@
           <a:p>
             <a:fld id="{DE2DA490-63B1-4B7A-B9AD-9A630F5DB54A}" type="datetimeFigureOut">
               <a:rPr lang="pt-PT" smtClean="0"/>
-              <a:t>02/06/2021</a:t>
+              <a:t>08/06/2021</a:t>
             </a:fld>
             <a:endParaRPr lang="pt-PT" dirty="0"/>
           </a:p>
@@ -2803,7 +2804,7 @@
           <a:p>
             <a:fld id="{C2E14CD9-B4E2-40A0-9B57-2B41076E5BFE}" type="slidenum">
               <a:rPr lang="pt-PT" smtClean="0"/>
-              <a:t>‹#›</a:t>
+              <a:t>‹nº›</a:t>
             </a:fld>
             <a:endParaRPr lang="pt-PT" dirty="0"/>
           </a:p>
@@ -3082,7 +3083,7 @@
           <a:p>
             <a:fld id="{DE2DA490-63B1-4B7A-B9AD-9A630F5DB54A}" type="datetimeFigureOut">
               <a:rPr lang="pt-PT" smtClean="0"/>
-              <a:t>02/06/2021</a:t>
+              <a:t>08/06/2021</a:t>
             </a:fld>
             <a:endParaRPr lang="pt-PT" dirty="0"/>
           </a:p>
@@ -3124,7 +3125,7 @@
           <a:p>
             <a:fld id="{C2E14CD9-B4E2-40A0-9B57-2B41076E5BFE}" type="slidenum">
               <a:rPr lang="pt-PT" smtClean="0"/>
-              <a:t>‹#›</a:t>
+              <a:t>‹nº›</a:t>
             </a:fld>
             <a:endParaRPr lang="pt-PT" dirty="0"/>
           </a:p>
@@ -3336,7 +3337,7 @@
           <a:p>
             <a:fld id="{DE2DA490-63B1-4B7A-B9AD-9A630F5DB54A}" type="datetimeFigureOut">
               <a:rPr lang="pt-PT" smtClean="0"/>
-              <a:t>02/06/2021</a:t>
+              <a:t>08/06/2021</a:t>
             </a:fld>
             <a:endParaRPr lang="pt-PT" dirty="0"/>
           </a:p>
@@ -3418,7 +3419,7 @@
           <a:p>
             <a:fld id="{C2E14CD9-B4E2-40A0-9B57-2B41076E5BFE}" type="slidenum">
               <a:rPr lang="pt-PT" smtClean="0"/>
-              <a:t>‹#›</a:t>
+              <a:t>‹nº›</a:t>
             </a:fld>
             <a:endParaRPr lang="pt-PT" dirty="0"/>
           </a:p>
@@ -4227,6 +4228,130 @@
 </p:sld>
 </file>
 
+<file path=ppt/slides/slide10.xml><?xml version="1.0" encoding="utf-8"?>
+<p:sld xmlns:a="http://schemas.openxmlformats.org/drawingml/2006/main" xmlns:r="http://schemas.openxmlformats.org/officeDocument/2006/relationships" xmlns:p="http://schemas.openxmlformats.org/presentationml/2006/main">
+  <p:cSld>
+    <p:spTree>
+      <p:nvGrpSpPr>
+        <p:cNvPr id="1" name=""/>
+        <p:cNvGrpSpPr/>
+        <p:nvPr/>
+      </p:nvGrpSpPr>
+      <p:grpSpPr>
+        <a:xfrm>
+          <a:off x="0" y="0"/>
+          <a:ext cx="0" cy="0"/>
+          <a:chOff x="0" y="0"/>
+          <a:chExt cx="0" cy="0"/>
+        </a:xfrm>
+      </p:grpSpPr>
+      <p:sp>
+        <p:nvSpPr>
+          <p:cNvPr id="2" name="Title 1">
+            <a:extLst>
+              <a:ext uri="{FF2B5EF4-FFF2-40B4-BE49-F238E27FC236}">
+                <a16:creationId xmlns:a16="http://schemas.microsoft.com/office/drawing/2014/main" id="{540DD248-1121-4389-9411-B7B8B8FF5AEB}"/>
+              </a:ext>
+            </a:extLst>
+          </p:cNvPr>
+          <p:cNvSpPr>
+            <a:spLocks noGrp="1"/>
+          </p:cNvSpPr>
+          <p:nvPr>
+            <p:ph type="title"/>
+          </p:nvPr>
+        </p:nvSpPr>
+        <p:spPr>
+          <a:xfrm>
+            <a:off x="3342314" y="3159136"/>
+            <a:ext cx="5507372" cy="539728"/>
+          </a:xfrm>
+        </p:spPr>
+        <p:txBody>
+          <a:bodyPr>
+            <a:normAutofit/>
+          </a:bodyPr>
+          <a:lstStyle/>
+          <a:p>
+            <a:pPr algn="ctr"/>
+            <a:r>
+              <a:rPr lang="en-US" sz="2000" spc="0" dirty="0">
+                <a:solidFill>
+                  <a:srgbClr val="61C461"/>
+                </a:solidFill>
+                <a:latin typeface="Nunito Sans" panose="00000800000000000000" pitchFamily="2" charset="0"/>
+                <a:cs typeface="Arial" panose="020B0604020202020204" pitchFamily="34" charset="0"/>
+                <a:hlinkClick r:id="rId2">
+                  <a:extLst>
+                    <a:ext uri="{A12FA001-AC4F-418D-AE19-62706E023703}">
+                      <ahyp:hlinkClr xmlns:ahyp="http://schemas.microsoft.com/office/drawing/2018/hyperlinkcolor" val="tx"/>
+                    </a:ext>
+                  </a:extLst>
+                </a:hlinkClick>
+              </a:rPr>
+              <a:t>https://github.com/ibbgomes/escutas/releases</a:t>
+            </a:r>
+            <a:endParaRPr lang="pt-PT" sz="2000" i="1" spc="0" dirty="0">
+              <a:solidFill>
+                <a:srgbClr val="61C461"/>
+              </a:solidFill>
+              <a:latin typeface="Nunito Sans" panose="00000800000000000000" pitchFamily="2" charset="0"/>
+              <a:cs typeface="Arial" panose="020B0604020202020204" pitchFamily="34" charset="0"/>
+            </a:endParaRPr>
+          </a:p>
+        </p:txBody>
+      </p:sp>
+      <p:pic>
+        <p:nvPicPr>
+          <p:cNvPr id="6" name="Content Placeholder 8">
+            <a:extLst>
+              <a:ext uri="{FF2B5EF4-FFF2-40B4-BE49-F238E27FC236}">
+                <a16:creationId xmlns:a16="http://schemas.microsoft.com/office/drawing/2014/main" id="{257E92B1-94DE-4A3B-8323-035ACB5CFCA7}"/>
+              </a:ext>
+            </a:extLst>
+          </p:cNvPr>
+          <p:cNvPicPr>
+            <a:picLocks noChangeAspect="1"/>
+          </p:cNvPicPr>
+          <p:nvPr/>
+        </p:nvPicPr>
+        <p:blipFill>
+          <a:blip r:embed="rId3">
+            <a:extLst>
+              <a:ext uri="{28A0092B-C50C-407E-A947-70E740481C1C}">
+                <a14:useLocalDpi xmlns:a14="http://schemas.microsoft.com/office/drawing/2010/main"/>
+              </a:ext>
+              <a:ext uri="{96DAC541-7B7A-43D3-8B79-37D633B846F1}">
+                <asvg:svgBlip xmlns:asvg="http://schemas.microsoft.com/office/drawing/2016/SVG/main" r:embed="rId4"/>
+              </a:ext>
+            </a:extLst>
+          </a:blip>
+          <a:srcRect/>
+          <a:stretch/>
+        </p:blipFill>
+        <p:spPr>
+          <a:xfrm>
+            <a:off x="11464889" y="4651893"/>
+            <a:ext cx="585531" cy="2082135"/>
+          </a:xfrm>
+          <a:prstGeom prst="rect">
+            <a:avLst/>
+          </a:prstGeom>
+        </p:spPr>
+      </p:pic>
+    </p:spTree>
+    <p:extLst>
+      <p:ext uri="{BB962C8B-B14F-4D97-AF65-F5344CB8AC3E}">
+        <p14:creationId xmlns:p14="http://schemas.microsoft.com/office/powerpoint/2010/main" val="2524273400"/>
+      </p:ext>
+    </p:extLst>
+  </p:cSld>
+  <p:clrMapOvr>
+    <a:masterClrMapping/>
+  </p:clrMapOvr>
+</p:sld>
+</file>
+
 <file path=ppt/slides/slide2.xml><?xml version="1.0" encoding="utf-8"?>
 <p:sld xmlns:a="http://schemas.openxmlformats.org/drawingml/2006/main" xmlns:r="http://schemas.openxmlformats.org/officeDocument/2006/relationships" xmlns:p="http://schemas.openxmlformats.org/presentationml/2006/main">
   <p:cSld>
@@ -6101,56 +6226,6 @@
               <a:t>e o utilizador é capaz de consultar os seus detalhes pessoais (avatar, nome de utilizador, grupo de escutismo, etc.) e terminar sessão na aplicação;</a:t>
             </a:r>
           </a:p>
-          <a:p>
-            <a:pPr>
-              <a:lnSpc>
-                <a:spcPct val="160000"/>
-              </a:lnSpc>
-            </a:pPr>
-            <a:r>
-              <a:rPr lang="pt-PT" dirty="0">
-                <a:latin typeface="Nunito Sans" panose="00000500000000000000" pitchFamily="2" charset="0"/>
-              </a:rPr>
-              <a:t>Vista onde são exibidas as últimas notícias relacionadas com o escutismo;</a:t>
-            </a:r>
-          </a:p>
-          <a:p>
-            <a:pPr>
-              <a:lnSpc>
-                <a:spcPct val="160000"/>
-              </a:lnSpc>
-            </a:pPr>
-            <a:r>
-              <a:rPr lang="pt-PT" dirty="0">
-                <a:latin typeface="Nunito Sans" panose="00000500000000000000" pitchFamily="2" charset="0"/>
-              </a:rPr>
-              <a:t>Calendário onde é possível consultar e criar eventos associados ao movimento escutista;</a:t>
-            </a:r>
-          </a:p>
-          <a:p>
-            <a:pPr>
-              <a:lnSpc>
-                <a:spcPct val="160000"/>
-              </a:lnSpc>
-            </a:pPr>
-            <a:r>
-              <a:rPr lang="pt-PT" dirty="0">
-                <a:latin typeface="Nunito Sans" panose="00000500000000000000" pitchFamily="2" charset="0"/>
-              </a:rPr>
-              <a:t>Consulta de grupos de escutismo nas proximidades, através de um mapa e respetivos mecanismos de localização;</a:t>
-            </a:r>
-          </a:p>
-          <a:p>
-            <a:pPr>
-              <a:lnSpc>
-                <a:spcPct val="160000"/>
-              </a:lnSpc>
-            </a:pPr>
-            <a:endParaRPr lang="pt-PT" dirty="0">
-              <a:effectLst/>
-              <a:latin typeface="Nunito Sans" panose="00000500000000000000" pitchFamily="2" charset="0"/>
-            </a:endParaRPr>
-          </a:p>
         </p:txBody>
       </p:sp>
       <p:pic>
@@ -6516,6 +6591,411 @@
               <a:rPr lang="pt-PT" dirty="0">
                 <a:latin typeface="Nunito Sans" panose="00000500000000000000" pitchFamily="2" charset="0"/>
               </a:rPr>
+              <a:t>Vista onde são exibidas as últimas notícias relacionadas com o escutismo;</a:t>
+            </a:r>
+          </a:p>
+          <a:p>
+            <a:pPr>
+              <a:lnSpc>
+                <a:spcPct val="160000"/>
+              </a:lnSpc>
+            </a:pPr>
+            <a:r>
+              <a:rPr lang="pt-PT" dirty="0">
+                <a:latin typeface="Nunito Sans" panose="00000500000000000000" pitchFamily="2" charset="0"/>
+              </a:rPr>
+              <a:t>Calendário onde é possível consultar e criar eventos associados ao movimento escutista;</a:t>
+            </a:r>
+          </a:p>
+          <a:p>
+            <a:pPr>
+              <a:lnSpc>
+                <a:spcPct val="160000"/>
+              </a:lnSpc>
+            </a:pPr>
+            <a:r>
+              <a:rPr lang="pt-PT" dirty="0">
+                <a:latin typeface="Nunito Sans" panose="00000500000000000000" pitchFamily="2" charset="0"/>
+              </a:rPr>
+              <a:t>Consulta de grupos de escutismo nas proximidades, através de um mapa e respetivos mecanismos de localização;</a:t>
+            </a:r>
+          </a:p>
+          <a:p>
+            <a:pPr>
+              <a:lnSpc>
+                <a:spcPct val="160000"/>
+              </a:lnSpc>
+            </a:pPr>
+            <a:endParaRPr lang="pt-PT" dirty="0">
+              <a:effectLst/>
+              <a:latin typeface="Nunito Sans" panose="00000500000000000000" pitchFamily="2" charset="0"/>
+            </a:endParaRPr>
+          </a:p>
+        </p:txBody>
+      </p:sp>
+      <p:pic>
+        <p:nvPicPr>
+          <p:cNvPr id="7" name="Content Placeholder 8">
+            <a:extLst>
+              <a:ext uri="{FF2B5EF4-FFF2-40B4-BE49-F238E27FC236}">
+                <a16:creationId xmlns:a16="http://schemas.microsoft.com/office/drawing/2014/main" id="{2F8A29B6-2042-427C-B218-E73BDD040FE3}"/>
+              </a:ext>
+            </a:extLst>
+          </p:cNvPr>
+          <p:cNvPicPr>
+            <a:picLocks noChangeAspect="1"/>
+          </p:cNvPicPr>
+          <p:nvPr/>
+        </p:nvPicPr>
+        <p:blipFill>
+          <a:blip r:embed="rId2">
+            <a:extLst>
+              <a:ext uri="{28A0092B-C50C-407E-A947-70E740481C1C}">
+                <a14:useLocalDpi xmlns:a14="http://schemas.microsoft.com/office/drawing/2010/main"/>
+              </a:ext>
+              <a:ext uri="{96DAC541-7B7A-43D3-8B79-37D633B846F1}">
+                <asvg:svgBlip xmlns:asvg="http://schemas.microsoft.com/office/drawing/2016/SVG/main" r:embed="rId3"/>
+              </a:ext>
+            </a:extLst>
+          </a:blip>
+          <a:srcRect/>
+          <a:stretch/>
+        </p:blipFill>
+        <p:spPr>
+          <a:xfrm>
+            <a:off x="11464889" y="4651893"/>
+            <a:ext cx="585531" cy="2082135"/>
+          </a:xfrm>
+          <a:prstGeom prst="rect">
+            <a:avLst/>
+          </a:prstGeom>
+        </p:spPr>
+      </p:pic>
+    </p:spTree>
+    <p:extLst>
+      <p:ext uri="{BB962C8B-B14F-4D97-AF65-F5344CB8AC3E}">
+        <p14:creationId xmlns:p14="http://schemas.microsoft.com/office/powerpoint/2010/main" val="782478983"/>
+      </p:ext>
+    </p:extLst>
+  </p:cSld>
+  <p:clrMapOvr>
+    <a:masterClrMapping/>
+  </p:clrMapOvr>
+</p:sld>
+</file>
+
+<file path=ppt/slides/slide8.xml><?xml version="1.0" encoding="utf-8"?>
+<p:sld xmlns:a="http://schemas.openxmlformats.org/drawingml/2006/main" xmlns:r="http://schemas.openxmlformats.org/officeDocument/2006/relationships" xmlns:p="http://schemas.openxmlformats.org/presentationml/2006/main">
+  <p:cSld>
+    <p:spTree>
+      <p:nvGrpSpPr>
+        <p:cNvPr id="1" name=""/>
+        <p:cNvGrpSpPr/>
+        <p:nvPr/>
+      </p:nvGrpSpPr>
+      <p:grpSpPr>
+        <a:xfrm>
+          <a:off x="0" y="0"/>
+          <a:ext cx="0" cy="0"/>
+          <a:chOff x="0" y="0"/>
+          <a:chExt cx="0" cy="0"/>
+        </a:xfrm>
+      </p:grpSpPr>
+      <p:sp>
+        <p:nvSpPr>
+          <p:cNvPr id="2" name="Subtítulo 2">
+            <a:extLst>
+              <a:ext uri="{FF2B5EF4-FFF2-40B4-BE49-F238E27FC236}">
+                <a16:creationId xmlns:a16="http://schemas.microsoft.com/office/drawing/2014/main" id="{4C27BC55-4A1B-4219-AA2F-36521603FBD9}"/>
+              </a:ext>
+            </a:extLst>
+          </p:cNvPr>
+          <p:cNvSpPr txBox="1">
+            <a:spLocks/>
+          </p:cNvSpPr>
+          <p:nvPr/>
+        </p:nvSpPr>
+        <p:spPr>
+          <a:xfrm>
+            <a:off x="803864" y="822231"/>
+            <a:ext cx="10227659" cy="5949950"/>
+          </a:xfrm>
+          <a:prstGeom prst="rect">
+            <a:avLst/>
+          </a:prstGeom>
+        </p:spPr>
+        <p:txBody>
+          <a:bodyPr vert="horz" lIns="91440" tIns="45720" rIns="91440" bIns="45720" rtlCol="0">
+            <a:normAutofit/>
+          </a:bodyPr>
+          <a:lstStyle>
+            <a:lvl1pPr marL="182880" indent="-182880" algn="l" defTabSz="914400" rtl="0" eaLnBrk="1" latinLnBrk="0" hangingPunct="1">
+              <a:lnSpc>
+                <a:spcPct val="95000"/>
+              </a:lnSpc>
+              <a:spcBef>
+                <a:spcPts val="1400"/>
+              </a:spcBef>
+              <a:spcAft>
+                <a:spcPts val="200"/>
+              </a:spcAft>
+              <a:buClr>
+                <a:schemeClr val="accent1"/>
+              </a:buClr>
+              <a:buSzPct val="80000"/>
+              <a:buFont typeface="Arial" pitchFamily="34" charset="0"/>
+              <a:buChar char="•"/>
+              <a:defRPr sz="1800" kern="1200" spc="10" baseline="0">
+                <a:solidFill>
+                  <a:schemeClr val="tx1"/>
+                </a:solidFill>
+                <a:latin typeface="+mn-lt"/>
+                <a:ea typeface="+mn-ea"/>
+                <a:cs typeface="+mn-cs"/>
+              </a:defRPr>
+            </a:lvl1pPr>
+            <a:lvl2pPr marL="457200" indent="-182880" algn="l" defTabSz="914400" rtl="0" eaLnBrk="1" latinLnBrk="0" hangingPunct="1">
+              <a:lnSpc>
+                <a:spcPct val="90000"/>
+              </a:lnSpc>
+              <a:spcBef>
+                <a:spcPts val="300"/>
+              </a:spcBef>
+              <a:spcAft>
+                <a:spcPts val="300"/>
+              </a:spcAft>
+              <a:buClr>
+                <a:schemeClr val="accent1"/>
+              </a:buClr>
+              <a:buFont typeface="Wingdings 2" pitchFamily="18" charset="2"/>
+              <a:buChar char=""/>
+              <a:defRPr sz="1600" kern="1200">
+                <a:solidFill>
+                  <a:schemeClr val="tx1">
+                    <a:lumMod val="85000"/>
+                    <a:lumOff val="15000"/>
+                  </a:schemeClr>
+                </a:solidFill>
+                <a:latin typeface="+mn-lt"/>
+                <a:ea typeface="+mn-ea"/>
+                <a:cs typeface="+mn-cs"/>
+              </a:defRPr>
+            </a:lvl2pPr>
+            <a:lvl3pPr marL="731520" indent="-182880" algn="l" defTabSz="914400" rtl="0" eaLnBrk="1" latinLnBrk="0" hangingPunct="1">
+              <a:lnSpc>
+                <a:spcPct val="90000"/>
+              </a:lnSpc>
+              <a:spcBef>
+                <a:spcPts val="300"/>
+              </a:spcBef>
+              <a:spcAft>
+                <a:spcPts val="300"/>
+              </a:spcAft>
+              <a:buClr>
+                <a:schemeClr val="accent1"/>
+              </a:buClr>
+              <a:buFont typeface="Wingdings 2" pitchFamily="18" charset="2"/>
+              <a:buChar char=""/>
+              <a:defRPr sz="1400" kern="1200">
+                <a:solidFill>
+                  <a:schemeClr val="tx1">
+                    <a:lumMod val="85000"/>
+                    <a:lumOff val="15000"/>
+                  </a:schemeClr>
+                </a:solidFill>
+                <a:latin typeface="+mn-lt"/>
+                <a:ea typeface="+mn-ea"/>
+                <a:cs typeface="+mn-cs"/>
+              </a:defRPr>
+            </a:lvl3pPr>
+            <a:lvl4pPr marL="1005840" indent="-182880" algn="l" defTabSz="914400" rtl="0" eaLnBrk="1" latinLnBrk="0" hangingPunct="1">
+              <a:lnSpc>
+                <a:spcPct val="90000"/>
+              </a:lnSpc>
+              <a:spcBef>
+                <a:spcPts val="300"/>
+              </a:spcBef>
+              <a:spcAft>
+                <a:spcPts val="300"/>
+              </a:spcAft>
+              <a:buClr>
+                <a:schemeClr val="accent1"/>
+              </a:buClr>
+              <a:buFont typeface="Wingdings 2" pitchFamily="18" charset="2"/>
+              <a:buChar char=""/>
+              <a:defRPr sz="1400" kern="1200">
+                <a:solidFill>
+                  <a:schemeClr val="tx1">
+                    <a:lumMod val="85000"/>
+                    <a:lumOff val="15000"/>
+                  </a:schemeClr>
+                </a:solidFill>
+                <a:latin typeface="+mn-lt"/>
+                <a:ea typeface="+mn-ea"/>
+                <a:cs typeface="+mn-cs"/>
+              </a:defRPr>
+            </a:lvl4pPr>
+            <a:lvl5pPr marL="1280160" indent="-182880" algn="l" defTabSz="914400" rtl="0" eaLnBrk="1" latinLnBrk="0" hangingPunct="1">
+              <a:lnSpc>
+                <a:spcPct val="90000"/>
+              </a:lnSpc>
+              <a:spcBef>
+                <a:spcPts val="300"/>
+              </a:spcBef>
+              <a:spcAft>
+                <a:spcPts val="300"/>
+              </a:spcAft>
+              <a:buClr>
+                <a:schemeClr val="accent1"/>
+              </a:buClr>
+              <a:buFont typeface="Wingdings 2" pitchFamily="18" charset="2"/>
+              <a:buChar char=""/>
+              <a:defRPr sz="1400" kern="1200">
+                <a:solidFill>
+                  <a:schemeClr val="tx1">
+                    <a:lumMod val="85000"/>
+                    <a:lumOff val="15000"/>
+                  </a:schemeClr>
+                </a:solidFill>
+                <a:latin typeface="+mn-lt"/>
+                <a:ea typeface="+mn-ea"/>
+                <a:cs typeface="+mn-cs"/>
+              </a:defRPr>
+            </a:lvl5pPr>
+            <a:lvl6pPr marL="1600000" indent="-228600" algn="l" defTabSz="914400" rtl="0" eaLnBrk="1" latinLnBrk="0" hangingPunct="1">
+              <a:lnSpc>
+                <a:spcPct val="90000"/>
+              </a:lnSpc>
+              <a:spcBef>
+                <a:spcPts val="300"/>
+              </a:spcBef>
+              <a:spcAft>
+                <a:spcPts val="300"/>
+              </a:spcAft>
+              <a:buClr>
+                <a:schemeClr val="accent1"/>
+              </a:buClr>
+              <a:buFont typeface="Wingdings 2" pitchFamily="18" charset="2"/>
+              <a:buChar char=""/>
+              <a:defRPr sz="1400" kern="1200">
+                <a:solidFill>
+                  <a:schemeClr val="tx1">
+                    <a:lumMod val="85000"/>
+                    <a:lumOff val="15000"/>
+                  </a:schemeClr>
+                </a:solidFill>
+                <a:latin typeface="+mn-lt"/>
+                <a:ea typeface="+mn-ea"/>
+                <a:cs typeface="+mn-cs"/>
+              </a:defRPr>
+            </a:lvl6pPr>
+            <a:lvl7pPr marL="1900000" indent="-228600" algn="l" defTabSz="914400" rtl="0" eaLnBrk="1" latinLnBrk="0" hangingPunct="1">
+              <a:lnSpc>
+                <a:spcPct val="90000"/>
+              </a:lnSpc>
+              <a:spcBef>
+                <a:spcPts val="300"/>
+              </a:spcBef>
+              <a:spcAft>
+                <a:spcPts val="300"/>
+              </a:spcAft>
+              <a:buClr>
+                <a:schemeClr val="accent1"/>
+              </a:buClr>
+              <a:buFont typeface="Wingdings 2" pitchFamily="18" charset="2"/>
+              <a:buChar char=""/>
+              <a:defRPr sz="1400" kern="1200">
+                <a:solidFill>
+                  <a:schemeClr val="tx1">
+                    <a:lumMod val="85000"/>
+                    <a:lumOff val="15000"/>
+                  </a:schemeClr>
+                </a:solidFill>
+                <a:latin typeface="+mn-lt"/>
+                <a:ea typeface="+mn-ea"/>
+                <a:cs typeface="+mn-cs"/>
+              </a:defRPr>
+            </a:lvl7pPr>
+            <a:lvl8pPr marL="2200000" indent="-228600" algn="l" defTabSz="914400" rtl="0" eaLnBrk="1" latinLnBrk="0" hangingPunct="1">
+              <a:lnSpc>
+                <a:spcPct val="90000"/>
+              </a:lnSpc>
+              <a:spcBef>
+                <a:spcPts val="300"/>
+              </a:spcBef>
+              <a:spcAft>
+                <a:spcPts val="300"/>
+              </a:spcAft>
+              <a:buClr>
+                <a:schemeClr val="accent1"/>
+              </a:buClr>
+              <a:buFont typeface="Wingdings 2" pitchFamily="18" charset="2"/>
+              <a:buChar char=""/>
+              <a:defRPr sz="1400" kern="1200">
+                <a:solidFill>
+                  <a:schemeClr val="tx1">
+                    <a:lumMod val="85000"/>
+                    <a:lumOff val="15000"/>
+                  </a:schemeClr>
+                </a:solidFill>
+                <a:latin typeface="+mn-lt"/>
+                <a:ea typeface="+mn-ea"/>
+                <a:cs typeface="+mn-cs"/>
+              </a:defRPr>
+            </a:lvl8pPr>
+            <a:lvl9pPr marL="2500000" indent="-228600" algn="l" defTabSz="914400" rtl="0" eaLnBrk="1" latinLnBrk="0" hangingPunct="1">
+              <a:lnSpc>
+                <a:spcPct val="90000"/>
+              </a:lnSpc>
+              <a:spcBef>
+                <a:spcPts val="300"/>
+              </a:spcBef>
+              <a:spcAft>
+                <a:spcPts val="300"/>
+              </a:spcAft>
+              <a:buClr>
+                <a:schemeClr val="accent1"/>
+              </a:buClr>
+              <a:buFont typeface="Wingdings 2" pitchFamily="18" charset="2"/>
+              <a:buChar char=""/>
+              <a:defRPr sz="1400" kern="1200">
+                <a:solidFill>
+                  <a:schemeClr val="tx1">
+                    <a:lumMod val="85000"/>
+                    <a:lumOff val="15000"/>
+                  </a:schemeClr>
+                </a:solidFill>
+                <a:latin typeface="+mn-lt"/>
+                <a:ea typeface="+mn-ea"/>
+                <a:cs typeface="+mn-cs"/>
+              </a:defRPr>
+            </a:lvl9pPr>
+          </a:lstStyle>
+          <a:p>
+            <a:pPr marL="0" indent="0">
+              <a:buNone/>
+            </a:pPr>
+            <a:r>
+              <a:rPr lang="pt-PT" sz="2600" b="1" dirty="0">
+                <a:solidFill>
+                  <a:srgbClr val="1275B2"/>
+                </a:solidFill>
+                <a:latin typeface="Nunito Sans" panose="00000800000000000000" pitchFamily="2" charset="0"/>
+                <a:cs typeface="Arial" panose="020B0604020202020204" pitchFamily="34" charset="0"/>
+              </a:rPr>
+              <a:t>Funcionalidades</a:t>
+            </a:r>
+          </a:p>
+          <a:p>
+            <a:pPr>
+              <a:lnSpc>
+                <a:spcPct val="160000"/>
+              </a:lnSpc>
+            </a:pPr>
+            <a:r>
+              <a:rPr lang="pt-PT" dirty="0">
+                <a:latin typeface="Nunito Sans" panose="00000500000000000000" pitchFamily="2" charset="0"/>
+              </a:rPr>
               <a:t>Galeria que inclui álbuns de fotografias. Os mesmos encontram-se associados a eventos;</a:t>
             </a:r>
           </a:p>
@@ -6606,7 +7086,7 @@
 </p:sld>
 </file>
 
-<file path=ppt/slides/slide8.xml><?xml version="1.0" encoding="utf-8"?>
+<file path=ppt/slides/slide9.xml><?xml version="1.0" encoding="utf-8"?>
 <p:sld xmlns:a="http://schemas.openxmlformats.org/drawingml/2006/main" xmlns:r="http://schemas.openxmlformats.org/officeDocument/2006/relationships" xmlns:p="http://schemas.openxmlformats.org/presentationml/2006/main">
   <p:cSld>
     <p:spTree>
@@ -6713,130 +7193,6 @@
     <p:extLst>
       <p:ext uri="{BB962C8B-B14F-4D97-AF65-F5344CB8AC3E}">
         <p14:creationId xmlns:p14="http://schemas.microsoft.com/office/powerpoint/2010/main" val="3241235506"/>
-      </p:ext>
-    </p:extLst>
-  </p:cSld>
-  <p:clrMapOvr>
-    <a:masterClrMapping/>
-  </p:clrMapOvr>
-</p:sld>
-</file>
-
-<file path=ppt/slides/slide9.xml><?xml version="1.0" encoding="utf-8"?>
-<p:sld xmlns:a="http://schemas.openxmlformats.org/drawingml/2006/main" xmlns:r="http://schemas.openxmlformats.org/officeDocument/2006/relationships" xmlns:p="http://schemas.openxmlformats.org/presentationml/2006/main">
-  <p:cSld>
-    <p:spTree>
-      <p:nvGrpSpPr>
-        <p:cNvPr id="1" name=""/>
-        <p:cNvGrpSpPr/>
-        <p:nvPr/>
-      </p:nvGrpSpPr>
-      <p:grpSpPr>
-        <a:xfrm>
-          <a:off x="0" y="0"/>
-          <a:ext cx="0" cy="0"/>
-          <a:chOff x="0" y="0"/>
-          <a:chExt cx="0" cy="0"/>
-        </a:xfrm>
-      </p:grpSpPr>
-      <p:sp>
-        <p:nvSpPr>
-          <p:cNvPr id="2" name="Title 1">
-            <a:extLst>
-              <a:ext uri="{FF2B5EF4-FFF2-40B4-BE49-F238E27FC236}">
-                <a16:creationId xmlns:a16="http://schemas.microsoft.com/office/drawing/2014/main" id="{540DD248-1121-4389-9411-B7B8B8FF5AEB}"/>
-              </a:ext>
-            </a:extLst>
-          </p:cNvPr>
-          <p:cNvSpPr>
-            <a:spLocks noGrp="1"/>
-          </p:cNvSpPr>
-          <p:nvPr>
-            <p:ph type="title"/>
-          </p:nvPr>
-        </p:nvSpPr>
-        <p:spPr>
-          <a:xfrm>
-            <a:off x="3342314" y="3159136"/>
-            <a:ext cx="5507372" cy="539728"/>
-          </a:xfrm>
-        </p:spPr>
-        <p:txBody>
-          <a:bodyPr>
-            <a:normAutofit/>
-          </a:bodyPr>
-          <a:lstStyle/>
-          <a:p>
-            <a:pPr algn="ctr"/>
-            <a:r>
-              <a:rPr lang="en-US" sz="2000" spc="0" dirty="0">
-                <a:solidFill>
-                  <a:srgbClr val="61C461"/>
-                </a:solidFill>
-                <a:latin typeface="Nunito Sans" panose="00000800000000000000" pitchFamily="2" charset="0"/>
-                <a:cs typeface="Arial" panose="020B0604020202020204" pitchFamily="34" charset="0"/>
-                <a:hlinkClick r:id="rId2">
-                  <a:extLst>
-                    <a:ext uri="{A12FA001-AC4F-418D-AE19-62706E023703}">
-                      <ahyp:hlinkClr xmlns:ahyp="http://schemas.microsoft.com/office/drawing/2018/hyperlinkcolor" val="tx"/>
-                    </a:ext>
-                  </a:extLst>
-                </a:hlinkClick>
-              </a:rPr>
-              <a:t>https://github.com/ibbgomes/escutas/releases</a:t>
-            </a:r>
-            <a:endParaRPr lang="pt-PT" sz="2000" i="1" spc="0" dirty="0">
-              <a:solidFill>
-                <a:srgbClr val="61C461"/>
-              </a:solidFill>
-              <a:latin typeface="Nunito Sans" panose="00000800000000000000" pitchFamily="2" charset="0"/>
-              <a:cs typeface="Arial" panose="020B0604020202020204" pitchFamily="34" charset="0"/>
-            </a:endParaRPr>
-          </a:p>
-        </p:txBody>
-      </p:sp>
-      <p:pic>
-        <p:nvPicPr>
-          <p:cNvPr id="6" name="Content Placeholder 8">
-            <a:extLst>
-              <a:ext uri="{FF2B5EF4-FFF2-40B4-BE49-F238E27FC236}">
-                <a16:creationId xmlns:a16="http://schemas.microsoft.com/office/drawing/2014/main" id="{257E92B1-94DE-4A3B-8323-035ACB5CFCA7}"/>
-              </a:ext>
-            </a:extLst>
-          </p:cNvPr>
-          <p:cNvPicPr>
-            <a:picLocks noChangeAspect="1"/>
-          </p:cNvPicPr>
-          <p:nvPr/>
-        </p:nvPicPr>
-        <p:blipFill>
-          <a:blip r:embed="rId3">
-            <a:extLst>
-              <a:ext uri="{28A0092B-C50C-407E-A947-70E740481C1C}">
-                <a14:useLocalDpi xmlns:a14="http://schemas.microsoft.com/office/drawing/2010/main"/>
-              </a:ext>
-              <a:ext uri="{96DAC541-7B7A-43D3-8B79-37D633B846F1}">
-                <asvg:svgBlip xmlns:asvg="http://schemas.microsoft.com/office/drawing/2016/SVG/main" r:embed="rId4"/>
-              </a:ext>
-            </a:extLst>
-          </a:blip>
-          <a:srcRect/>
-          <a:stretch/>
-        </p:blipFill>
-        <p:spPr>
-          <a:xfrm>
-            <a:off x="11464889" y="4651893"/>
-            <a:ext cx="585531" cy="2082135"/>
-          </a:xfrm>
-          <a:prstGeom prst="rect">
-            <a:avLst/>
-          </a:prstGeom>
-        </p:spPr>
-      </p:pic>
-    </p:spTree>
-    <p:extLst>
-      <p:ext uri="{BB962C8B-B14F-4D97-AF65-F5344CB8AC3E}">
-        <p14:creationId xmlns:p14="http://schemas.microsoft.com/office/powerpoint/2010/main" val="2524273400"/>
       </p:ext>
     </p:extLst>
   </p:cSld>

</xml_diff>